<commit_message>
Updates PPT file (reorder slides)
</commit_message>
<xml_diff>
--- a/Docs/ToolDesign_Simple.pptx
+++ b/Docs/ToolDesign_Simple.pptx
@@ -5,26 +5,27 @@
     <p:sldMasterId id="2147483648" r:id="rId1"/>
   </p:sldMasterIdLst>
   <p:notesMasterIdLst>
-    <p:notesMasterId r:id="rId19"/>
+    <p:notesMasterId r:id="rId20"/>
   </p:notesMasterIdLst>
   <p:sldIdLst>
     <p:sldId id="256" r:id="rId2"/>
     <p:sldId id="267" r:id="rId3"/>
     <p:sldId id="268" r:id="rId4"/>
     <p:sldId id="269" r:id="rId5"/>
-    <p:sldId id="271" r:id="rId6"/>
-    <p:sldId id="272" r:id="rId7"/>
-    <p:sldId id="270" r:id="rId8"/>
-    <p:sldId id="263" r:id="rId9"/>
-    <p:sldId id="264" r:id="rId10"/>
-    <p:sldId id="265" r:id="rId11"/>
-    <p:sldId id="266" r:id="rId12"/>
-    <p:sldId id="258" r:id="rId13"/>
-    <p:sldId id="257" r:id="rId14"/>
-    <p:sldId id="259" r:id="rId15"/>
-    <p:sldId id="260" r:id="rId16"/>
-    <p:sldId id="262" r:id="rId17"/>
-    <p:sldId id="261" r:id="rId18"/>
+    <p:sldId id="270" r:id="rId6"/>
+    <p:sldId id="271" r:id="rId7"/>
+    <p:sldId id="272" r:id="rId8"/>
+    <p:sldId id="273" r:id="rId9"/>
+    <p:sldId id="263" r:id="rId10"/>
+    <p:sldId id="264" r:id="rId11"/>
+    <p:sldId id="265" r:id="rId12"/>
+    <p:sldId id="266" r:id="rId13"/>
+    <p:sldId id="258" r:id="rId14"/>
+    <p:sldId id="257" r:id="rId15"/>
+    <p:sldId id="259" r:id="rId16"/>
+    <p:sldId id="260" r:id="rId17"/>
+    <p:sldId id="262" r:id="rId18"/>
+    <p:sldId id="261" r:id="rId19"/>
   </p:sldIdLst>
   <p:sldSz cx="12192000" cy="6858000"/>
   <p:notesSz cx="6858000" cy="9144000"/>
@@ -718,7 +719,7 @@
           <a:p>
             <a:fld id="{2FDC19FB-B5BF-4AF1-A018-EAD8D29F4C16}" type="slidenum">
               <a:rPr lang="en-US" smtClean="0"/>
-              <a:t>17</a:t>
+              <a:t>18</a:t>
             </a:fld>
             <a:endParaRPr lang="en-US"/>
           </a:p>
@@ -810,7 +811,7 @@
           <a:p>
             <a:fld id="{2FDC19FB-B5BF-4AF1-A018-EAD8D29F4C16}" type="slidenum">
               <a:rPr lang="en-US" smtClean="0"/>
-              <a:t>8</a:t>
+              <a:t>9</a:t>
             </a:fld>
             <a:endParaRPr lang="en-US"/>
           </a:p>
@@ -918,7 +919,7 @@
           <a:p>
             <a:fld id="{2FDC19FB-B5BF-4AF1-A018-EAD8D29F4C16}" type="slidenum">
               <a:rPr lang="en-US" smtClean="0"/>
-              <a:t>9</a:t>
+              <a:t>10</a:t>
             </a:fld>
             <a:endParaRPr lang="en-US"/>
           </a:p>
@@ -1015,7 +1016,7 @@
           <a:p>
             <a:fld id="{2FDC19FB-B5BF-4AF1-A018-EAD8D29F4C16}" type="slidenum">
               <a:rPr lang="en-US" smtClean="0"/>
-              <a:t>10</a:t>
+              <a:t>11</a:t>
             </a:fld>
             <a:endParaRPr lang="en-US"/>
           </a:p>
@@ -1126,7 +1127,7 @@
           <a:p>
             <a:fld id="{2FDC19FB-B5BF-4AF1-A018-EAD8D29F4C16}" type="slidenum">
               <a:rPr lang="en-US" smtClean="0"/>
-              <a:t>11</a:t>
+              <a:t>12</a:t>
             </a:fld>
             <a:endParaRPr lang="en-US"/>
           </a:p>
@@ -1237,7 +1238,7 @@
           <a:p>
             <a:fld id="{2FDC19FB-B5BF-4AF1-A018-EAD8D29F4C16}" type="slidenum">
               <a:rPr lang="en-US" smtClean="0"/>
-              <a:t>12</a:t>
+              <a:t>13</a:t>
             </a:fld>
             <a:endParaRPr lang="en-US"/>
           </a:p>
@@ -1355,7 +1356,7 @@
           <a:p>
             <a:fld id="{2FDC19FB-B5BF-4AF1-A018-EAD8D29F4C16}" type="slidenum">
               <a:rPr lang="en-US" smtClean="0"/>
-              <a:t>13</a:t>
+              <a:t>14</a:t>
             </a:fld>
             <a:endParaRPr lang="en-US"/>
           </a:p>
@@ -1447,7 +1448,7 @@
           <a:p>
             <a:fld id="{2FDC19FB-B5BF-4AF1-A018-EAD8D29F4C16}" type="slidenum">
               <a:rPr lang="en-US" smtClean="0"/>
-              <a:t>14</a:t>
+              <a:t>15</a:t>
             </a:fld>
             <a:endParaRPr lang="en-US"/>
           </a:p>
@@ -1539,7 +1540,7 @@
           <a:p>
             <a:fld id="{2FDC19FB-B5BF-4AF1-A018-EAD8D29F4C16}" type="slidenum">
               <a:rPr lang="en-US" smtClean="0"/>
-              <a:t>16</a:t>
+              <a:t>17</a:t>
             </a:fld>
             <a:endParaRPr lang="en-US"/>
           </a:p>
@@ -4467,22 +4468,14 @@
           <a:p>
             <a:r>
               <a:rPr lang="en-US" sz="5400" dirty="0" smtClean="0"/>
-              <a:t>Geospatial </a:t>
-            </a:r>
-            <a:r>
-              <a:rPr lang="en-US" sz="5400" dirty="0" smtClean="0"/>
-              <a:t>Wetland</a:t>
+              <a:t>Geospatial Wetland</a:t>
             </a:r>
             <a:br>
               <a:rPr lang="en-US" sz="5400" dirty="0" smtClean="0"/>
             </a:br>
             <a:r>
               <a:rPr lang="en-US" sz="5400" dirty="0" smtClean="0"/>
-              <a:t>Assessment </a:t>
-            </a:r>
-            <a:r>
-              <a:rPr lang="en-US" sz="5400" dirty="0" smtClean="0"/>
-              <a:t>Tool</a:t>
+              <a:t>Assessment Tool</a:t>
             </a:r>
           </a:p>
           <a:p>
@@ -4563,11 +4556,454 @@
           <a:p>
             <a:r>
               <a:rPr lang="en-US" sz="4400" dirty="0" smtClean="0"/>
-              <a:t>Data Prep: </a:t>
-            </a:r>
+              <a:t>Data Prep: 2</a:t>
+            </a:r>
+            <a:endParaRPr lang="en-US" sz="4400" dirty="0"/>
+          </a:p>
+        </p:txBody>
+      </p:sp>
+      <p:sp>
+        <p:nvSpPr>
+          <p:cNvPr id="3" name="TextBox 2"/>
+          <p:cNvSpPr txBox="1"/>
+          <p:nvPr/>
+        </p:nvSpPr>
+        <p:spPr>
+          <a:xfrm>
+            <a:off x="386359" y="1110964"/>
+            <a:ext cx="7683753" cy="3447098"/>
+          </a:xfrm>
+          <a:prstGeom prst="rect">
+            <a:avLst/>
+          </a:prstGeom>
+          <a:noFill/>
+        </p:spPr>
+        <p:txBody>
+          <a:bodyPr wrap="square" rtlCol="0">
+            <a:spAutoFit/>
+          </a:bodyPr>
+          <a:lstStyle/>
+          <a:p>
+            <a:pPr marL="342900" indent="-342900">
+              <a:buFont typeface="+mj-lt"/>
+              <a:buAutoNum type="arabicPeriod"/>
+            </a:pPr>
+            <a:r>
+              <a:rPr lang="en-US" b="1" dirty="0" smtClean="0"/>
+              <a:t>Generate StreamCat</a:t>
+            </a:r>
+            <a:r>
+              <a:rPr lang="en-US" b="1" dirty="0"/>
+              <a:t> attribute list: </a:t>
+            </a:r>
+            <a:r>
+              <a:rPr lang="en-US" sz="1400" dirty="0" smtClean="0"/>
+              <a:t>Create </a:t>
+            </a:r>
+            <a:r>
+              <a:rPr lang="en-US" sz="1400" dirty="0"/>
+              <a:t>a CSV file listing all the attributes included in the Stream Cat data alongside the file in which they occur. This is used in later scripts to extract specific attributes from the proper file</a:t>
+            </a:r>
+            <a:r>
+              <a:rPr lang="en-US" sz="1400" dirty="0" smtClean="0"/>
+              <a:t>.</a:t>
+            </a:r>
+          </a:p>
+          <a:p>
+            <a:pPr marL="342900" indent="-342900">
+              <a:buFont typeface="+mj-lt"/>
+              <a:buAutoNum type="arabicPeriod"/>
+            </a:pPr>
+            <a:endParaRPr lang="en-US" sz="1400" dirty="0"/>
+          </a:p>
+          <a:p>
+            <a:pPr marL="342900" indent="-342900">
+              <a:buFont typeface="+mj-lt"/>
+              <a:buAutoNum type="arabicPeriod"/>
+            </a:pPr>
+            <a:endParaRPr lang="en-US" sz="1400" dirty="0" smtClean="0"/>
+          </a:p>
+          <a:p>
+            <a:pPr marL="342900" indent="-342900">
+              <a:buFont typeface="+mj-lt"/>
+              <a:buAutoNum type="arabicPeriod"/>
+            </a:pPr>
+            <a:endParaRPr lang="en-US" sz="1400" dirty="0"/>
+          </a:p>
+          <a:p>
+            <a:pPr marL="342900" indent="-342900">
+              <a:buFont typeface="+mj-lt"/>
+              <a:buAutoNum type="arabicPeriod"/>
+            </a:pPr>
+            <a:endParaRPr lang="en-US" sz="1400" dirty="0" smtClean="0"/>
+          </a:p>
+          <a:p>
+            <a:pPr marL="342900" indent="-342900">
+              <a:buFont typeface="+mj-lt"/>
+              <a:buAutoNum type="arabicPeriod"/>
+            </a:pPr>
+            <a:endParaRPr lang="en-US" sz="1400" dirty="0"/>
+          </a:p>
+          <a:p>
+            <a:pPr marL="342900" indent="-342900">
+              <a:buFont typeface="+mj-lt"/>
+              <a:buAutoNum type="arabicPeriod"/>
+            </a:pPr>
+            <a:endParaRPr lang="en-US" sz="1400" dirty="0" smtClean="0"/>
+          </a:p>
+          <a:p>
+            <a:pPr marL="342900" indent="-342900">
+              <a:buFont typeface="+mj-lt"/>
+              <a:buAutoNum type="arabicPeriod"/>
+            </a:pPr>
+            <a:endParaRPr lang="en-US" sz="1400" dirty="0" smtClean="0"/>
+          </a:p>
+          <a:p>
+            <a:pPr marL="342900" indent="-342900">
+              <a:buFont typeface="+mj-lt"/>
+              <a:buAutoNum type="arabicPeriod"/>
+            </a:pPr>
+            <a:endParaRPr lang="en-US" sz="1400" dirty="0"/>
+          </a:p>
+          <a:p>
+            <a:pPr marL="342900" indent="-342900">
+              <a:buFont typeface="+mj-lt"/>
+              <a:buAutoNum type="arabicPeriod"/>
+            </a:pPr>
+            <a:endParaRPr lang="en-US" sz="1400" dirty="0" smtClean="0"/>
+          </a:p>
+          <a:p>
+            <a:pPr marL="342900" indent="-342900">
+              <a:buFont typeface="+mj-lt"/>
+              <a:buAutoNum type="arabicPeriod"/>
+            </a:pPr>
+            <a:r>
+              <a:rPr lang="en-US" b="1" dirty="0" smtClean="0"/>
+              <a:t>Set additional attribute filters</a:t>
+            </a:r>
+            <a:r>
+              <a:rPr lang="en-US" dirty="0" smtClean="0"/>
+              <a:t>: </a:t>
+            </a:r>
+            <a:r>
+              <a:rPr lang="en-US" sz="1400" dirty="0" smtClean="0"/>
+              <a:t>Manually pivot the list and add columns indicating whether the attribute is for the catchment (CAT) or entire watershed area (WS). Also indicate the NLCD class aligned with the attribute (or -9999 if none). </a:t>
+            </a:r>
+            <a:endParaRPr lang="en-US" sz="1600" dirty="0"/>
+          </a:p>
+        </p:txBody>
+      </p:sp>
+      <p:pic>
+        <p:nvPicPr>
+          <p:cNvPr id="21" name="Picture 20"/>
+          <p:cNvPicPr>
+            <a:picLocks noChangeAspect="1"/>
+          </p:cNvPicPr>
+          <p:nvPr/>
+        </p:nvPicPr>
+        <p:blipFill>
+          <a:blip r:embed="rId3"/>
+          <a:stretch>
+            <a:fillRect/>
+          </a:stretch>
+        </p:blipFill>
+        <p:spPr>
+          <a:xfrm>
+            <a:off x="3379265" y="4591618"/>
+            <a:ext cx="6196571" cy="1909763"/>
+          </a:xfrm>
+          <a:prstGeom prst="rect">
+            <a:avLst/>
+          </a:prstGeom>
+          <a:ln>
+            <a:noFill/>
+          </a:ln>
+          <a:effectLst>
+            <a:outerShdw blurRad="292100" dist="139700" dir="2700000" algn="tl" rotWithShape="0">
+              <a:srgbClr val="333333">
+                <a:alpha val="65000"/>
+              </a:srgbClr>
+            </a:outerShdw>
+          </a:effectLst>
+        </p:spPr>
+      </p:pic>
+      <p:pic>
+        <p:nvPicPr>
+          <p:cNvPr id="23" name="Picture 22"/>
+          <p:cNvPicPr>
+            <a:picLocks noChangeAspect="1"/>
+          </p:cNvPicPr>
+          <p:nvPr/>
+        </p:nvPicPr>
+        <p:blipFill>
+          <a:blip r:embed="rId4"/>
+          <a:stretch>
+            <a:fillRect/>
+          </a:stretch>
+        </p:blipFill>
+        <p:spPr>
+          <a:xfrm>
+            <a:off x="8240231" y="1683309"/>
+            <a:ext cx="3652944" cy="2431491"/>
+          </a:xfrm>
+          <a:prstGeom prst="rect">
+            <a:avLst/>
+          </a:prstGeom>
+          <a:ln>
+            <a:noFill/>
+          </a:ln>
+          <a:effectLst>
+            <a:outerShdw blurRad="292100" dist="139700" dir="2700000" algn="tl" rotWithShape="0">
+              <a:srgbClr val="333333">
+                <a:alpha val="65000"/>
+              </a:srgbClr>
+            </a:outerShdw>
+          </a:effectLst>
+        </p:spPr>
+      </p:pic>
+      <p:pic>
+        <p:nvPicPr>
+          <p:cNvPr id="25" name="Picture 24"/>
+          <p:cNvPicPr>
+            <a:picLocks noChangeAspect="1"/>
+          </p:cNvPicPr>
+          <p:nvPr/>
+        </p:nvPicPr>
+        <p:blipFill rotWithShape="1">
+          <a:blip r:embed="rId5"/>
+          <a:srcRect r="4729" b="8114"/>
+          <a:stretch/>
+        </p:blipFill>
+        <p:spPr>
+          <a:xfrm>
+            <a:off x="1786301" y="2027085"/>
+            <a:ext cx="4883868" cy="509777"/>
+          </a:xfrm>
+          <a:prstGeom prst="rect">
+            <a:avLst/>
+          </a:prstGeom>
+        </p:spPr>
+      </p:pic>
+      <p:cxnSp>
+        <p:nvCxnSpPr>
+          <p:cNvPr id="28" name="Straight Arrow Connector 27"/>
+          <p:cNvCxnSpPr>
+            <a:stCxn id="25" idx="3"/>
+            <a:endCxn id="23" idx="1"/>
+          </p:cNvCxnSpPr>
+          <p:nvPr/>
+        </p:nvCxnSpPr>
+        <p:spPr>
+          <a:xfrm>
+            <a:off x="6670169" y="2281974"/>
+            <a:ext cx="1570062" cy="617081"/>
+          </a:xfrm>
+          <a:prstGeom prst="straightConnector1">
+            <a:avLst/>
+          </a:prstGeom>
+          <a:ln>
+            <a:tailEnd type="triangle"/>
+          </a:ln>
+        </p:spPr>
+        <p:style>
+          <a:lnRef idx="1">
+            <a:schemeClr val="accent1"/>
+          </a:lnRef>
+          <a:fillRef idx="0">
+            <a:schemeClr val="accent1"/>
+          </a:fillRef>
+          <a:effectRef idx="0">
+            <a:schemeClr val="accent1"/>
+          </a:effectRef>
+          <a:fontRef idx="minor">
+            <a:schemeClr val="tx1"/>
+          </a:fontRef>
+        </p:style>
+      </p:cxnSp>
+      <p:sp>
+        <p:nvSpPr>
+          <p:cNvPr id="40" name="Rectangle 39"/>
+          <p:cNvSpPr/>
+          <p:nvPr/>
+        </p:nvSpPr>
+        <p:spPr>
+          <a:xfrm>
+            <a:off x="8560072" y="1003422"/>
+            <a:ext cx="3013261" cy="646331"/>
+          </a:xfrm>
+          <a:prstGeom prst="rect">
+            <a:avLst/>
+          </a:prstGeom>
+        </p:spPr>
+        <p:style>
+          <a:lnRef idx="2">
+            <a:schemeClr val="accent6"/>
+          </a:lnRef>
+          <a:fillRef idx="1">
+            <a:schemeClr val="lt1"/>
+          </a:fillRef>
+          <a:effectRef idx="0">
+            <a:schemeClr val="accent6"/>
+          </a:effectRef>
+          <a:fontRef idx="minor">
+            <a:schemeClr val="dk1"/>
+          </a:fontRef>
+        </p:style>
+        <p:txBody>
+          <a:bodyPr wrap="none">
+            <a:spAutoFit/>
+          </a:bodyPr>
+          <a:lstStyle/>
+          <a:p>
+            <a:r>
+              <a:rPr lang="en-US" i="1" dirty="0"/>
+              <a:t>C:\</a:t>
+            </a:r>
+            <a:r>
+              <a:rPr lang="en-US" i="1" dirty="0" smtClean="0"/>
+              <a:t>Workspace\GeoWET\Data\</a:t>
+            </a:r>
+          </a:p>
+          <a:p>
+            <a:r>
+              <a:rPr lang="en-US" i="1" dirty="0" err="1" smtClean="0"/>
+              <a:t>StreamCat</a:t>
+            </a:r>
+            <a:r>
+              <a:rPr lang="en-US" i="1" dirty="0" smtClean="0"/>
+              <a:t>\StreamCatInfo.csv</a:t>
+            </a:r>
+            <a:endParaRPr lang="en-US" i="1" dirty="0"/>
+          </a:p>
+        </p:txBody>
+      </p:sp>
+      <p:sp>
+        <p:nvSpPr>
+          <p:cNvPr id="41" name="Rectangle 40"/>
+          <p:cNvSpPr/>
+          <p:nvPr/>
+        </p:nvSpPr>
+        <p:spPr>
+          <a:xfrm>
+            <a:off x="264404" y="5256889"/>
+            <a:ext cx="3013261" cy="646331"/>
+          </a:xfrm>
+          <a:prstGeom prst="rect">
+            <a:avLst/>
+          </a:prstGeom>
+        </p:spPr>
+        <p:style>
+          <a:lnRef idx="2">
+            <a:schemeClr val="accent6"/>
+          </a:lnRef>
+          <a:fillRef idx="1">
+            <a:schemeClr val="lt1"/>
+          </a:fillRef>
+          <a:effectRef idx="0">
+            <a:schemeClr val="accent6"/>
+          </a:effectRef>
+          <a:fontRef idx="minor">
+            <a:schemeClr val="dk1"/>
+          </a:fontRef>
+        </p:style>
+        <p:txBody>
+          <a:bodyPr wrap="none">
+            <a:spAutoFit/>
+          </a:bodyPr>
+          <a:lstStyle/>
+          <a:p>
+            <a:r>
+              <a:rPr lang="en-US" i="1" dirty="0"/>
+              <a:t>C:\</a:t>
+            </a:r>
+            <a:r>
+              <a:rPr lang="en-US" i="1" dirty="0" smtClean="0"/>
+              <a:t>Workspace\GeoWET\Data\</a:t>
+            </a:r>
+          </a:p>
+          <a:p>
+            <a:r>
+              <a:rPr lang="en-US" i="1" dirty="0" err="1" smtClean="0"/>
+              <a:t>StreamCat</a:t>
+            </a:r>
+            <a:r>
+              <a:rPr lang="en-US" i="1" dirty="0" smtClean="0"/>
+              <a:t>\StreamCatInfo.xlsx</a:t>
+            </a:r>
+            <a:endParaRPr lang="en-US" i="1" dirty="0"/>
+          </a:p>
+        </p:txBody>
+      </p:sp>
+    </p:spTree>
+    <p:extLst>
+      <p:ext uri="{BB962C8B-B14F-4D97-AF65-F5344CB8AC3E}">
+        <p14:creationId xmlns:p14="http://schemas.microsoft.com/office/powerpoint/2010/main" val="1063045129"/>
+      </p:ext>
+    </p:extLst>
+  </p:cSld>
+  <p:clrMapOvr>
+    <a:masterClrMapping/>
+  </p:clrMapOvr>
+  <mc:AlternateContent xmlns:mc="http://schemas.openxmlformats.org/markup-compatibility/2006" xmlns:p14="http://schemas.microsoft.com/office/powerpoint/2010/main">
+    <mc:Choice Requires="p14">
+      <p:transition spd="slow" p14:dur="2000"/>
+    </mc:Choice>
+    <mc:Fallback xmlns="">
+      <p:transition spd="slow"/>
+    </mc:Fallback>
+  </mc:AlternateContent>
+  <p:timing>
+    <p:tnLst>
+      <p:par>
+        <p:cTn id="1" dur="indefinite" restart="never" nodeType="tmRoot"/>
+      </p:par>
+    </p:tnLst>
+  </p:timing>
+</p:sld>
+</file>
+
+<file path=ppt/slides/slide11.xml><?xml version="1.0" encoding="utf-8"?>
+<p:sld xmlns:a="http://schemas.openxmlformats.org/drawingml/2006/main" xmlns:r="http://schemas.openxmlformats.org/officeDocument/2006/relationships" xmlns:p="http://schemas.openxmlformats.org/presentationml/2006/main" show="0">
+  <p:cSld>
+    <p:spTree>
+      <p:nvGrpSpPr>
+        <p:cNvPr id="1" name=""/>
+        <p:cNvGrpSpPr/>
+        <p:nvPr/>
+      </p:nvGrpSpPr>
+      <p:grpSpPr>
+        <a:xfrm>
+          <a:off x="0" y="0"/>
+          <a:ext cx="0" cy="0"/>
+          <a:chOff x="0" y="0"/>
+          <a:chExt cx="0" cy="0"/>
+        </a:xfrm>
+      </p:grpSpPr>
+      <p:sp>
+        <p:nvSpPr>
+          <p:cNvPr id="2" name="TextBox 1"/>
+          <p:cNvSpPr txBox="1"/>
+          <p:nvPr/>
+        </p:nvSpPr>
+        <p:spPr>
+          <a:xfrm>
+            <a:off x="264404" y="341523"/>
+            <a:ext cx="3002425" cy="769441"/>
+          </a:xfrm>
+          <a:prstGeom prst="rect">
+            <a:avLst/>
+          </a:prstGeom>
+          <a:noFill/>
+        </p:spPr>
+        <p:txBody>
+          <a:bodyPr wrap="none" rtlCol="0">
+            <a:spAutoFit/>
+          </a:bodyPr>
+          <a:lstStyle/>
+          <a:p>
             <a:r>
               <a:rPr lang="en-US" sz="4400" dirty="0" smtClean="0"/>
-              <a:t>3</a:t>
+              <a:t>Data Prep: 3</a:t>
             </a:r>
             <a:endParaRPr lang="en-US" sz="4400" dirty="0"/>
           </a:p>
@@ -16864,11 +17300,11 @@
   <p:clrMapOvr>
     <a:masterClrMapping/>
   </p:clrMapOvr>
-  <mc:AlternateContent xmlns:mc="http://schemas.openxmlformats.org/markup-compatibility/2006">
-    <mc:Choice xmlns:p14="http://schemas.microsoft.com/office/powerpoint/2010/main" Requires="p14">
+  <mc:AlternateContent xmlns:mc="http://schemas.openxmlformats.org/markup-compatibility/2006" xmlns:p14="http://schemas.microsoft.com/office/powerpoint/2010/main">
+    <mc:Choice Requires="p14">
       <p:transition spd="slow" p14:dur="2000"/>
     </mc:Choice>
-    <mc:Fallback>
+    <mc:Fallback xmlns="">
       <p:transition spd="slow"/>
     </mc:Fallback>
   </mc:AlternateContent>
@@ -16882,7 +17318,7 @@
 </p:sld>
 </file>
 
-<file path=ppt/slides/slide11.xml><?xml version="1.0" encoding="utf-8"?>
+<file path=ppt/slides/slide12.xml><?xml version="1.0" encoding="utf-8"?>
 <p:sld xmlns:a="http://schemas.openxmlformats.org/drawingml/2006/main" xmlns:r="http://schemas.openxmlformats.org/officeDocument/2006/relationships" xmlns:p="http://schemas.openxmlformats.org/presentationml/2006/main" show="0">
   <p:cSld>
     <p:spTree>
@@ -16923,11 +17359,7 @@
           <a:p>
             <a:r>
               <a:rPr lang="en-US" sz="4400" dirty="0" smtClean="0"/>
-              <a:t>Data Prep: </a:t>
-            </a:r>
-            <a:r>
-              <a:rPr lang="en-US" sz="4400" dirty="0" smtClean="0"/>
-              <a:t>4</a:t>
+              <a:t>Data Prep: 4</a:t>
             </a:r>
             <a:endParaRPr lang="en-US" sz="4400" dirty="0"/>
           </a:p>
@@ -17248,11 +17680,11 @@
   <p:clrMapOvr>
     <a:masterClrMapping/>
   </p:clrMapOvr>
-  <mc:AlternateContent xmlns:mc="http://schemas.openxmlformats.org/markup-compatibility/2006">
-    <mc:Choice xmlns:p14="http://schemas.microsoft.com/office/powerpoint/2010/main" Requires="p14">
+  <mc:AlternateContent xmlns:mc="http://schemas.openxmlformats.org/markup-compatibility/2006" xmlns:p14="http://schemas.microsoft.com/office/powerpoint/2010/main">
+    <mc:Choice Requires="p14">
       <p:transition spd="slow" p14:dur="2000"/>
     </mc:Choice>
-    <mc:Fallback>
+    <mc:Fallback xmlns="">
       <p:transition spd="slow"/>
     </mc:Fallback>
   </mc:AlternateContent>
@@ -17266,7 +17698,7 @@
 </p:sld>
 </file>
 
-<file path=ppt/slides/slide12.xml><?xml version="1.0" encoding="utf-8"?>
+<file path=ppt/slides/slide13.xml><?xml version="1.0" encoding="utf-8"?>
 <p:sld xmlns:a="http://schemas.openxmlformats.org/drawingml/2006/main" xmlns:r="http://schemas.openxmlformats.org/officeDocument/2006/relationships" xmlns:p="http://schemas.openxmlformats.org/presentationml/2006/main" show="0">
   <p:cSld>
     <p:spTree>
@@ -17313,7 +17745,6 @@
               <a:rPr lang="en-US" sz="4400" dirty="0"/>
               <a:t>5</a:t>
             </a:r>
-            <a:endParaRPr lang="en-US" sz="4400" dirty="0"/>
           </a:p>
         </p:txBody>
       </p:sp>
@@ -17412,11 +17843,11 @@
   <p:clrMapOvr>
     <a:masterClrMapping/>
   </p:clrMapOvr>
-  <mc:AlternateContent xmlns:mc="http://schemas.openxmlformats.org/markup-compatibility/2006">
-    <mc:Choice xmlns:p14="http://schemas.microsoft.com/office/powerpoint/2010/main" Requires="p14">
+  <mc:AlternateContent xmlns:mc="http://schemas.openxmlformats.org/markup-compatibility/2006" xmlns:p14="http://schemas.microsoft.com/office/powerpoint/2010/main">
+    <mc:Choice Requires="p14">
       <p:transition spd="slow" p14:dur="2000"/>
     </mc:Choice>
-    <mc:Fallback>
+    <mc:Fallback xmlns="">
       <p:transition spd="slow"/>
     </mc:Fallback>
   </mc:AlternateContent>
@@ -17430,7 +17861,7 @@
 </p:sld>
 </file>
 
-<file path=ppt/slides/slide13.xml><?xml version="1.0" encoding="utf-8"?>
+<file path=ppt/slides/slide14.xml><?xml version="1.0" encoding="utf-8"?>
 <p:sld xmlns:a="http://schemas.openxmlformats.org/drawingml/2006/main" xmlns:r="http://schemas.openxmlformats.org/officeDocument/2006/relationships" xmlns:p="http://schemas.openxmlformats.org/presentationml/2006/main" show="0">
   <p:cSld>
     <p:spTree>
@@ -19778,182 +20209,11 @@
   <p:clrMapOvr>
     <a:masterClrMapping/>
   </p:clrMapOvr>
-  <mc:AlternateContent xmlns:mc="http://schemas.openxmlformats.org/markup-compatibility/2006">
-    <mc:Choice xmlns:p14="http://schemas.microsoft.com/office/powerpoint/2010/main" Requires="p14">
+  <mc:AlternateContent xmlns:mc="http://schemas.openxmlformats.org/markup-compatibility/2006" xmlns:p14="http://schemas.microsoft.com/office/powerpoint/2010/main">
+    <mc:Choice Requires="p14">
       <p:transition spd="slow" p14:dur="2000"/>
     </mc:Choice>
-    <mc:Fallback>
-      <p:transition spd="slow"/>
-    </mc:Fallback>
-  </mc:AlternateContent>
-  <p:timing>
-    <p:tnLst>
-      <p:par>
-        <p:cTn id="1" dur="indefinite" restart="never" nodeType="tmRoot"/>
-      </p:par>
-    </p:tnLst>
-  </p:timing>
-</p:sld>
-</file>
-
-<file path=ppt/slides/slide14.xml><?xml version="1.0" encoding="utf-8"?>
-<p:sld xmlns:a="http://schemas.openxmlformats.org/drawingml/2006/main" xmlns:r="http://schemas.openxmlformats.org/officeDocument/2006/relationships" xmlns:p="http://schemas.openxmlformats.org/presentationml/2006/main" show="0">
-  <p:cSld>
-    <p:spTree>
-      <p:nvGrpSpPr>
-        <p:cNvPr id="1" name=""/>
-        <p:cNvGrpSpPr/>
-        <p:nvPr/>
-      </p:nvGrpSpPr>
-      <p:grpSpPr>
-        <a:xfrm>
-          <a:off x="0" y="0"/>
-          <a:ext cx="0" cy="0"/>
-          <a:chOff x="0" y="0"/>
-          <a:chExt cx="0" cy="0"/>
-        </a:xfrm>
-      </p:grpSpPr>
-      <p:sp>
-        <p:nvSpPr>
-          <p:cNvPr id="2" name="TextBox 1"/>
-          <p:cNvSpPr txBox="1"/>
-          <p:nvPr/>
-        </p:nvSpPr>
-        <p:spPr>
-          <a:xfrm>
-            <a:off x="766482" y="376518"/>
-            <a:ext cx="6036974" cy="2308324"/>
-          </a:xfrm>
-          <a:prstGeom prst="rect">
-            <a:avLst/>
-          </a:prstGeom>
-          <a:noFill/>
-        </p:spPr>
-        <p:txBody>
-          <a:bodyPr wrap="none" rtlCol="0">
-            <a:spAutoFit/>
-          </a:bodyPr>
-          <a:lstStyle/>
-          <a:p>
-            <a:pPr marL="285750" indent="-285750">
-              <a:buFont typeface="Arial" panose="020B0604020202020204" pitchFamily="34" charset="0"/>
-              <a:buChar char="•"/>
-            </a:pPr>
-            <a:r>
-              <a:rPr lang="en-US" dirty="0" smtClean="0"/>
-              <a:t>Get list of stream cat files that will be affected</a:t>
-            </a:r>
-          </a:p>
-          <a:p>
-            <a:pPr marL="285750" indent="-285750">
-              <a:buFont typeface="Arial" panose="020B0604020202020204" pitchFamily="34" charset="0"/>
-              <a:buChar char="•"/>
-            </a:pPr>
-            <a:r>
-              <a:rPr lang="en-US" dirty="0" smtClean="0"/>
-              <a:t>Extract stream cat records for HUC 8 </a:t>
-            </a:r>
-            <a:r>
-              <a:rPr lang="en-US" dirty="0" smtClean="0">
-                <a:sym typeface="Wingdings" panose="05000000000000000000" pitchFamily="2" charset="2"/>
-              </a:rPr>
-              <a:t> </a:t>
-            </a:r>
-            <a:r>
-              <a:rPr lang="en-US" dirty="0" err="1" smtClean="0">
-                <a:sym typeface="Wingdings" panose="05000000000000000000" pitchFamily="2" charset="2"/>
-              </a:rPr>
-              <a:t>dataDF</a:t>
-            </a:r>
-            <a:endParaRPr lang="en-US" dirty="0" smtClean="0"/>
-          </a:p>
-          <a:p>
-            <a:pPr marL="285750" indent="-285750">
-              <a:buFont typeface="Arial" panose="020B0604020202020204" pitchFamily="34" charset="0"/>
-              <a:buChar char="•"/>
-            </a:pPr>
-            <a:r>
-              <a:rPr lang="en-US" dirty="0" smtClean="0"/>
-              <a:t>Update catchment records</a:t>
-            </a:r>
-          </a:p>
-          <a:p>
-            <a:pPr marL="742950" lvl="1" indent="-285750">
-              <a:buFont typeface="Arial" panose="020B0604020202020204" pitchFamily="34" charset="0"/>
-              <a:buChar char="•"/>
-            </a:pPr>
-            <a:r>
-              <a:rPr lang="en-US" dirty="0" smtClean="0"/>
-              <a:t>Identify land cover change underneath project</a:t>
-            </a:r>
-          </a:p>
-          <a:p>
-            <a:pPr marL="742950" lvl="1" indent="-285750">
-              <a:buFont typeface="Arial" panose="020B0604020202020204" pitchFamily="34" charset="0"/>
-              <a:buChar char="•"/>
-            </a:pPr>
-            <a:r>
-              <a:rPr lang="en-US" dirty="0" smtClean="0"/>
-              <a:t>Decrease values in catchment records of </a:t>
-            </a:r>
-            <a:r>
-              <a:rPr lang="en-US" dirty="0" err="1" smtClean="0"/>
-              <a:t>dataDF</a:t>
-            </a:r>
-            <a:endParaRPr lang="en-US" dirty="0" smtClean="0"/>
-          </a:p>
-          <a:p>
-            <a:pPr marL="285750" indent="-285750">
-              <a:buFont typeface="Arial" panose="020B0604020202020204" pitchFamily="34" charset="0"/>
-              <a:buChar char="•"/>
-            </a:pPr>
-            <a:r>
-              <a:rPr lang="en-US" dirty="0" smtClean="0"/>
-              <a:t>Update watershed records</a:t>
-            </a:r>
-          </a:p>
-          <a:p>
-            <a:pPr marL="742950" lvl="1" indent="-285750">
-              <a:buFont typeface="Arial" panose="020B0604020202020204" pitchFamily="34" charset="0"/>
-              <a:buChar char="•"/>
-            </a:pPr>
-            <a:r>
-              <a:rPr lang="en-US" dirty="0" smtClean="0"/>
-              <a:t>Identify catchments downstream of project catchment</a:t>
-            </a:r>
-          </a:p>
-          <a:p>
-            <a:pPr marL="742950" lvl="1" indent="-285750">
-              <a:buFont typeface="Arial" panose="020B0604020202020204" pitchFamily="34" charset="0"/>
-              <a:buChar char="•"/>
-            </a:pPr>
-            <a:r>
-              <a:rPr lang="en-US" dirty="0" smtClean="0"/>
-              <a:t>Update </a:t>
-            </a:r>
-            <a:r>
-              <a:rPr lang="en-US" smtClean="0"/>
-              <a:t>attribute records</a:t>
-            </a:r>
-            <a:endParaRPr lang="en-US" dirty="0"/>
-          </a:p>
-        </p:txBody>
-      </p:sp>
-    </p:spTree>
-    <p:extLst>
-      <p:ext uri="{BB962C8B-B14F-4D97-AF65-F5344CB8AC3E}">
-        <p14:creationId xmlns:p14="http://schemas.microsoft.com/office/powerpoint/2010/main" val="2285474562"/>
-      </p:ext>
-    </p:extLst>
-  </p:cSld>
-  <p:clrMapOvr>
-    <a:masterClrMapping/>
-  </p:clrMapOvr>
-  <mc:AlternateContent xmlns:mc="http://schemas.openxmlformats.org/markup-compatibility/2006">
-    <mc:Choice xmlns:p14="http://schemas.microsoft.com/office/powerpoint/2010/main" Requires="p14">
-      <p:transition spd="slow" p14:dur="2000"/>
-    </mc:Choice>
-    <mc:Fallback>
+    <mc:Fallback xmlns="">
       <p:transition spd="slow"/>
     </mc:Fallback>
   </mc:AlternateContent>
@@ -19992,8 +20252,8 @@
         </p:nvSpPr>
         <p:spPr>
           <a:xfrm>
-            <a:off x="0" y="0"/>
-            <a:ext cx="6334699" cy="7109639"/>
+            <a:off x="766482" y="376518"/>
+            <a:ext cx="6036974" cy="2308324"/>
           </a:xfrm>
           <a:prstGeom prst="rect">
             <a:avLst/>
@@ -20001,33 +20261,18 @@
           <a:noFill/>
         </p:spPr>
         <p:txBody>
-          <a:bodyPr wrap="square" rtlCol="0">
+          <a:bodyPr wrap="none" rtlCol="0">
             <a:spAutoFit/>
           </a:bodyPr>
           <a:lstStyle/>
-          <a:p>
-            <a:r>
-              <a:rPr lang="en-US" dirty="0" smtClean="0"/>
-              <a:t>Create Alternate SWD File</a:t>
-            </a:r>
-          </a:p>
-          <a:p>
-            <a:endParaRPr lang="en-US" dirty="0"/>
-          </a:p>
-          <a:p>
-            <a:r>
-              <a:rPr lang="en-US" dirty="0" smtClean="0"/>
-              <a:t>Inputs:</a:t>
-            </a:r>
-          </a:p>
           <a:p>
             <a:pPr marL="285750" indent="-285750">
               <a:buFont typeface="Arial" panose="020B0604020202020204" pitchFamily="34" charset="0"/>
               <a:buChar char="•"/>
             </a:pPr>
             <a:r>
-              <a:rPr lang="en-US" sz="1600" dirty="0" smtClean="0"/>
-              <a:t>Project shapefile: boundary of project</a:t>
+              <a:rPr lang="en-US" dirty="0" smtClean="0"/>
+              <a:t>Get list of stream cat files that will be affected</a:t>
             </a:r>
           </a:p>
           <a:p>
@@ -20036,9 +20281,22 @@
               <a:buChar char="•"/>
             </a:pPr>
             <a:r>
-              <a:rPr lang="en-US" sz="1600" dirty="0" smtClean="0"/>
-              <a:t>Project type: wetland or forest</a:t>
-            </a:r>
+              <a:rPr lang="en-US" dirty="0" smtClean="0"/>
+              <a:t>Extract stream cat records for HUC 8 </a:t>
+            </a:r>
+            <a:r>
+              <a:rPr lang="en-US" dirty="0" smtClean="0">
+                <a:sym typeface="Wingdings" panose="05000000000000000000" pitchFamily="2" charset="2"/>
+              </a:rPr>
+              <a:t> </a:t>
+            </a:r>
+            <a:r>
+              <a:rPr lang="en-US" dirty="0" err="1" smtClean="0">
+                <a:sym typeface="Wingdings" panose="05000000000000000000" pitchFamily="2" charset="2"/>
+              </a:rPr>
+              <a:t>dataDF</a:t>
+            </a:r>
+            <a:endParaRPr lang="en-US" dirty="0" smtClean="0"/>
           </a:p>
           <a:p>
             <a:pPr marL="285750" indent="-285750">
@@ -20046,9 +20304,34 @@
               <a:buChar char="•"/>
             </a:pPr>
             <a:r>
-              <a:rPr lang="en-US" sz="1600" dirty="0" smtClean="0"/>
-              <a:t>Catchment data folder: containing StreamCat CSV files</a:t>
-            </a:r>
+              <a:rPr lang="en-US" dirty="0" smtClean="0"/>
+              <a:t>Update catchment records</a:t>
+            </a:r>
+          </a:p>
+          <a:p>
+            <a:pPr marL="742950" lvl="1" indent="-285750">
+              <a:buFont typeface="Arial" panose="020B0604020202020204" pitchFamily="34" charset="0"/>
+              <a:buChar char="•"/>
+            </a:pPr>
+            <a:r>
+              <a:rPr lang="en-US" dirty="0" smtClean="0"/>
+              <a:t>Identify land cover change underneath project</a:t>
+            </a:r>
+          </a:p>
+          <a:p>
+            <a:pPr marL="742950" lvl="1" indent="-285750">
+              <a:buFont typeface="Arial" panose="020B0604020202020204" pitchFamily="34" charset="0"/>
+              <a:buChar char="•"/>
+            </a:pPr>
+            <a:r>
+              <a:rPr lang="en-US" dirty="0" smtClean="0"/>
+              <a:t>Decrease values in catchment records of </a:t>
+            </a:r>
+            <a:r>
+              <a:rPr lang="en-US" dirty="0" err="1" smtClean="0"/>
+              <a:t>dataDF</a:t>
+            </a:r>
+            <a:endParaRPr lang="en-US" dirty="0" smtClean="0"/>
           </a:p>
           <a:p>
             <a:pPr marL="285750" indent="-285750">
@@ -20056,97 +20339,8 @@
               <a:buChar char="•"/>
             </a:pPr>
             <a:r>
-              <a:rPr lang="en-US" sz="1600" dirty="0" smtClean="0"/>
-              <a:t>Fieldmap.xlsx file: </a:t>
-            </a:r>
-            <a:r>
-              <a:rPr lang="en-US" sz="1600" i="1" dirty="0" smtClean="0"/>
-              <a:t>see description</a:t>
-            </a:r>
-          </a:p>
-          <a:p>
-            <a:pPr marL="285750" indent="-285750">
-              <a:buFont typeface="Arial" panose="020B0604020202020204" pitchFamily="34" charset="0"/>
-              <a:buChar char="•"/>
-            </a:pPr>
-            <a:r>
-              <a:rPr lang="en-US" sz="1600" dirty="0" smtClean="0"/>
-              <a:t>NLCD raster: to determine current land cover types</a:t>
-            </a:r>
-          </a:p>
-          <a:p>
-            <a:pPr marL="285750" indent="-285750">
-              <a:buFont typeface="Arial" panose="020B0604020202020204" pitchFamily="34" charset="0"/>
-              <a:buChar char="•"/>
-            </a:pPr>
-            <a:r>
-              <a:rPr lang="en-US" sz="1600" dirty="0" smtClean="0"/>
-              <a:t>NHD </a:t>
-            </a:r>
-            <a:r>
-              <a:rPr lang="en-US" sz="1600" dirty="0" err="1" smtClean="0"/>
-              <a:t>Elev_cm</a:t>
-            </a:r>
-            <a:r>
-              <a:rPr lang="en-US" sz="1600" dirty="0" smtClean="0"/>
-              <a:t> raster: to compute slopes</a:t>
-            </a:r>
-          </a:p>
-          <a:p>
-            <a:pPr marL="285750" indent="-285750">
-              <a:buFont typeface="Arial" panose="020B0604020202020204" pitchFamily="34" charset="0"/>
-              <a:buChar char="•"/>
-            </a:pPr>
-            <a:r>
-              <a:rPr lang="en-US" sz="1600" dirty="0" smtClean="0"/>
-              <a:t>NHD Flowlines: to compute buffer area</a:t>
-            </a:r>
-          </a:p>
-          <a:p>
-            <a:pPr marL="285750" indent="-285750">
-              <a:buFont typeface="Arial" panose="020B0604020202020204" pitchFamily="34" charset="0"/>
-              <a:buChar char="•"/>
-            </a:pPr>
-            <a:r>
-              <a:rPr lang="en-US" sz="1600" dirty="0" smtClean="0"/>
-              <a:t>NHD Catchment raster: to identify project catchments</a:t>
-            </a:r>
-          </a:p>
-          <a:p>
-            <a:pPr marL="285750" indent="-285750">
-              <a:buFont typeface="Arial" panose="020B0604020202020204" pitchFamily="34" charset="0"/>
-              <a:buChar char="•"/>
-            </a:pPr>
-            <a:r>
-              <a:rPr lang="en-US" sz="1600" dirty="0" smtClean="0"/>
-              <a:t>NHD HUC12 features: to identify project HUC8</a:t>
-            </a:r>
-          </a:p>
-          <a:p>
-            <a:pPr marL="285750" indent="-285750">
-              <a:buFont typeface="Arial" panose="020B0604020202020204" pitchFamily="34" charset="0"/>
-              <a:buChar char="•"/>
-            </a:pPr>
-            <a:endParaRPr lang="en-US" sz="1600" dirty="0"/>
-          </a:p>
-          <a:p>
-            <a:r>
               <a:rPr lang="en-US" dirty="0" smtClean="0"/>
-              <a:t>Workflow</a:t>
-            </a:r>
-            <a:r>
-              <a:rPr lang="en-US" sz="1600" dirty="0" smtClean="0"/>
-              <a:t>:</a:t>
-            </a:r>
-          </a:p>
-          <a:p>
-            <a:pPr marL="285750" indent="-285750">
-              <a:buFont typeface="Arial" panose="020B0604020202020204" pitchFamily="34" charset="0"/>
-              <a:buChar char="•"/>
-            </a:pPr>
-            <a:r>
-              <a:rPr lang="en-US" sz="1600" dirty="0" smtClean="0"/>
-              <a:t>Compute the land cover changes from the project</a:t>
+              <a:t>Update watershed records</a:t>
             </a:r>
           </a:p>
           <a:p>
@@ -20155,8 +20349,8 @@
               <a:buChar char="•"/>
             </a:pPr>
             <a:r>
-              <a:rPr lang="en-US" sz="1600" dirty="0" smtClean="0"/>
-              <a:t>Net loss of NLCD cover types</a:t>
+              <a:rPr lang="en-US" dirty="0" smtClean="0"/>
+              <a:t>Identify catchments downstream of project catchment</a:t>
             </a:r>
           </a:p>
           <a:p>
@@ -20165,124 +20359,32 @@
               <a:buChar char="•"/>
             </a:pPr>
             <a:r>
-              <a:rPr lang="en-US" sz="1600" dirty="0" smtClean="0"/>
-              <a:t>Net loss of NLCD cover types in riparian zone</a:t>
-            </a:r>
-          </a:p>
-          <a:p>
-            <a:pPr marL="742950" lvl="1" indent="-285750">
-              <a:buFont typeface="Arial" panose="020B0604020202020204" pitchFamily="34" charset="0"/>
-              <a:buChar char="•"/>
-            </a:pPr>
-            <a:r>
-              <a:rPr lang="en-US" sz="1600" dirty="0" smtClean="0"/>
-              <a:t>Net loss of NLCD cover types in mid-slope areas</a:t>
-            </a:r>
-          </a:p>
-          <a:p>
-            <a:pPr marL="742950" lvl="1" indent="-285750">
-              <a:buFont typeface="Arial" panose="020B0604020202020204" pitchFamily="34" charset="0"/>
-              <a:buChar char="•"/>
-            </a:pPr>
-            <a:r>
-              <a:rPr lang="en-US" sz="1600" dirty="0" smtClean="0"/>
-              <a:t>Net loss of NLCD cover types in high-slope areas</a:t>
-            </a:r>
-          </a:p>
-          <a:p>
-            <a:pPr marL="285750" indent="-285750">
-              <a:buFont typeface="Arial" panose="020B0604020202020204" pitchFamily="34" charset="0"/>
-              <a:buChar char="•"/>
-            </a:pPr>
-            <a:r>
-              <a:rPr lang="en-US" sz="1600" dirty="0" smtClean="0"/>
-              <a:t>Identify the NHD catchment and HUC8 in which the project occurs</a:t>
-            </a:r>
-          </a:p>
-          <a:p>
-            <a:pPr marL="742950" lvl="1" indent="-285750">
-              <a:buFont typeface="Arial" panose="020B0604020202020204" pitchFamily="34" charset="0"/>
-              <a:buChar char="•"/>
-            </a:pPr>
-            <a:r>
-              <a:rPr lang="en-US" sz="1600" dirty="0" smtClean="0"/>
-              <a:t>Extract the NHD Catchment raster by the project </a:t>
-            </a:r>
-            <a:r>
-              <a:rPr lang="en-US" sz="1600" dirty="0"/>
-              <a:t>polygon</a:t>
-            </a:r>
-            <a:endParaRPr lang="en-US" sz="1600" dirty="0" smtClean="0"/>
-          </a:p>
-          <a:p>
-            <a:pPr marL="742950" lvl="1" indent="-285750">
-              <a:buFont typeface="Arial" panose="020B0604020202020204" pitchFamily="34" charset="0"/>
-              <a:buChar char="•"/>
-            </a:pPr>
-            <a:r>
-              <a:rPr lang="en-US" sz="1600" dirty="0" smtClean="0"/>
-              <a:t>Clip the HUC12 feature with the project polygon</a:t>
-            </a:r>
-          </a:p>
-          <a:p>
-            <a:pPr marL="285750" indent="-285750">
-              <a:buFont typeface="Arial" panose="020B0604020202020204" pitchFamily="34" charset="0"/>
-              <a:buChar char="•"/>
-            </a:pPr>
-            <a:r>
-              <a:rPr lang="en-US" sz="1600" dirty="0" smtClean="0"/>
-              <a:t>Create a list of the StreamCat CSV files to add to the output SWD</a:t>
-            </a:r>
-          </a:p>
-          <a:p>
-            <a:pPr marL="742950" lvl="1" indent="-285750">
-              <a:buFont typeface="Arial" panose="020B0604020202020204" pitchFamily="34" charset="0"/>
-              <a:buChar char="•"/>
-            </a:pPr>
-            <a:r>
-              <a:rPr lang="en-US" sz="1600" dirty="0" smtClean="0"/>
-              <a:t>Use the </a:t>
-            </a:r>
-            <a:r>
-              <a:rPr lang="en-US" sz="1600" dirty="0" err="1" smtClean="0"/>
-              <a:t>FieldMappings</a:t>
-            </a:r>
-            <a:r>
-              <a:rPr lang="en-US" sz="1600" dirty="0" smtClean="0"/>
-              <a:t> table to identify those CSV files with attributes that will change with the project, i.e., those linked to land cover change. </a:t>
-            </a:r>
-          </a:p>
-          <a:p>
-            <a:pPr marL="285750" indent="-285750">
-              <a:buFont typeface="Arial" panose="020B0604020202020204" pitchFamily="34" charset="0"/>
-              <a:buChar char="•"/>
-            </a:pPr>
-            <a:r>
-              <a:rPr lang="en-US" sz="1600" dirty="0" smtClean="0"/>
-              <a:t>Loop through each StreamCat CSV file…</a:t>
-            </a:r>
-          </a:p>
-          <a:p>
-            <a:pPr lvl="1"/>
-            <a:endParaRPr lang="en-US" sz="1600" dirty="0" smtClean="0"/>
+              <a:rPr lang="en-US" dirty="0" smtClean="0"/>
+              <a:t>Update </a:t>
+            </a:r>
+            <a:r>
+              <a:rPr lang="en-US" smtClean="0"/>
+              <a:t>attribute records</a:t>
+            </a:r>
+            <a:endParaRPr lang="en-US" dirty="0"/>
           </a:p>
         </p:txBody>
       </p:sp>
     </p:spTree>
     <p:extLst>
       <p:ext uri="{BB962C8B-B14F-4D97-AF65-F5344CB8AC3E}">
-        <p14:creationId xmlns:p14="http://schemas.microsoft.com/office/powerpoint/2010/main" val="2188111740"/>
+        <p14:creationId xmlns:p14="http://schemas.microsoft.com/office/powerpoint/2010/main" val="2285474562"/>
       </p:ext>
     </p:extLst>
   </p:cSld>
   <p:clrMapOvr>
     <a:masterClrMapping/>
   </p:clrMapOvr>
-  <mc:AlternateContent xmlns:mc="http://schemas.openxmlformats.org/markup-compatibility/2006">
-    <mc:Choice xmlns:p14="http://schemas.microsoft.com/office/powerpoint/2010/main" Requires="p14">
+  <mc:AlternateContent xmlns:mc="http://schemas.openxmlformats.org/markup-compatibility/2006" xmlns:p14="http://schemas.microsoft.com/office/powerpoint/2010/main">
+    <mc:Choice Requires="p14">
       <p:transition spd="slow" p14:dur="2000"/>
     </mc:Choice>
-    <mc:Fallback>
+    <mc:Fallback xmlns="">
       <p:transition spd="slow"/>
     </mc:Fallback>
   </mc:AlternateContent>
@@ -20297,6 +20399,335 @@
 </file>
 
 <file path=ppt/slides/slide16.xml><?xml version="1.0" encoding="utf-8"?>
+<p:sld xmlns:a="http://schemas.openxmlformats.org/drawingml/2006/main" xmlns:r="http://schemas.openxmlformats.org/officeDocument/2006/relationships" xmlns:p="http://schemas.openxmlformats.org/presentationml/2006/main" show="0">
+  <p:cSld>
+    <p:spTree>
+      <p:nvGrpSpPr>
+        <p:cNvPr id="1" name=""/>
+        <p:cNvGrpSpPr/>
+        <p:nvPr/>
+      </p:nvGrpSpPr>
+      <p:grpSpPr>
+        <a:xfrm>
+          <a:off x="0" y="0"/>
+          <a:ext cx="0" cy="0"/>
+          <a:chOff x="0" y="0"/>
+          <a:chExt cx="0" cy="0"/>
+        </a:xfrm>
+      </p:grpSpPr>
+      <p:sp>
+        <p:nvSpPr>
+          <p:cNvPr id="2" name="TextBox 1"/>
+          <p:cNvSpPr txBox="1"/>
+          <p:nvPr/>
+        </p:nvSpPr>
+        <p:spPr>
+          <a:xfrm>
+            <a:off x="0" y="0"/>
+            <a:ext cx="6334699" cy="7109639"/>
+          </a:xfrm>
+          <a:prstGeom prst="rect">
+            <a:avLst/>
+          </a:prstGeom>
+          <a:noFill/>
+        </p:spPr>
+        <p:txBody>
+          <a:bodyPr wrap="square" rtlCol="0">
+            <a:spAutoFit/>
+          </a:bodyPr>
+          <a:lstStyle/>
+          <a:p>
+            <a:r>
+              <a:rPr lang="en-US" dirty="0" smtClean="0"/>
+              <a:t>Create Alternate SWD File</a:t>
+            </a:r>
+          </a:p>
+          <a:p>
+            <a:endParaRPr lang="en-US" dirty="0"/>
+          </a:p>
+          <a:p>
+            <a:r>
+              <a:rPr lang="en-US" dirty="0" smtClean="0"/>
+              <a:t>Inputs:</a:t>
+            </a:r>
+          </a:p>
+          <a:p>
+            <a:pPr marL="285750" indent="-285750">
+              <a:buFont typeface="Arial" panose="020B0604020202020204" pitchFamily="34" charset="0"/>
+              <a:buChar char="•"/>
+            </a:pPr>
+            <a:r>
+              <a:rPr lang="en-US" sz="1600" dirty="0" smtClean="0"/>
+              <a:t>Project shapefile: boundary of project</a:t>
+            </a:r>
+          </a:p>
+          <a:p>
+            <a:pPr marL="285750" indent="-285750">
+              <a:buFont typeface="Arial" panose="020B0604020202020204" pitchFamily="34" charset="0"/>
+              <a:buChar char="•"/>
+            </a:pPr>
+            <a:r>
+              <a:rPr lang="en-US" sz="1600" dirty="0" smtClean="0"/>
+              <a:t>Project type: wetland or forest</a:t>
+            </a:r>
+          </a:p>
+          <a:p>
+            <a:pPr marL="285750" indent="-285750">
+              <a:buFont typeface="Arial" panose="020B0604020202020204" pitchFamily="34" charset="0"/>
+              <a:buChar char="•"/>
+            </a:pPr>
+            <a:r>
+              <a:rPr lang="en-US" sz="1600" dirty="0" smtClean="0"/>
+              <a:t>Catchment data folder: containing StreamCat CSV files</a:t>
+            </a:r>
+          </a:p>
+          <a:p>
+            <a:pPr marL="285750" indent="-285750">
+              <a:buFont typeface="Arial" panose="020B0604020202020204" pitchFamily="34" charset="0"/>
+              <a:buChar char="•"/>
+            </a:pPr>
+            <a:r>
+              <a:rPr lang="en-US" sz="1600" dirty="0" smtClean="0"/>
+              <a:t>Fieldmap.xlsx file: </a:t>
+            </a:r>
+            <a:r>
+              <a:rPr lang="en-US" sz="1600" i="1" dirty="0" smtClean="0"/>
+              <a:t>see description</a:t>
+            </a:r>
+          </a:p>
+          <a:p>
+            <a:pPr marL="285750" indent="-285750">
+              <a:buFont typeface="Arial" panose="020B0604020202020204" pitchFamily="34" charset="0"/>
+              <a:buChar char="•"/>
+            </a:pPr>
+            <a:r>
+              <a:rPr lang="en-US" sz="1600" dirty="0" smtClean="0"/>
+              <a:t>NLCD raster: to determine current land cover types</a:t>
+            </a:r>
+          </a:p>
+          <a:p>
+            <a:pPr marL="285750" indent="-285750">
+              <a:buFont typeface="Arial" panose="020B0604020202020204" pitchFamily="34" charset="0"/>
+              <a:buChar char="•"/>
+            </a:pPr>
+            <a:r>
+              <a:rPr lang="en-US" sz="1600" dirty="0" smtClean="0"/>
+              <a:t>NHD </a:t>
+            </a:r>
+            <a:r>
+              <a:rPr lang="en-US" sz="1600" dirty="0" err="1" smtClean="0"/>
+              <a:t>Elev_cm</a:t>
+            </a:r>
+            <a:r>
+              <a:rPr lang="en-US" sz="1600" dirty="0" smtClean="0"/>
+              <a:t> raster: to compute slopes</a:t>
+            </a:r>
+          </a:p>
+          <a:p>
+            <a:pPr marL="285750" indent="-285750">
+              <a:buFont typeface="Arial" panose="020B0604020202020204" pitchFamily="34" charset="0"/>
+              <a:buChar char="•"/>
+            </a:pPr>
+            <a:r>
+              <a:rPr lang="en-US" sz="1600" dirty="0" smtClean="0"/>
+              <a:t>NHD Flowlines: to compute buffer area</a:t>
+            </a:r>
+          </a:p>
+          <a:p>
+            <a:pPr marL="285750" indent="-285750">
+              <a:buFont typeface="Arial" panose="020B0604020202020204" pitchFamily="34" charset="0"/>
+              <a:buChar char="•"/>
+            </a:pPr>
+            <a:r>
+              <a:rPr lang="en-US" sz="1600" dirty="0" smtClean="0"/>
+              <a:t>NHD Catchment raster: to identify project catchments</a:t>
+            </a:r>
+          </a:p>
+          <a:p>
+            <a:pPr marL="285750" indent="-285750">
+              <a:buFont typeface="Arial" panose="020B0604020202020204" pitchFamily="34" charset="0"/>
+              <a:buChar char="•"/>
+            </a:pPr>
+            <a:r>
+              <a:rPr lang="en-US" sz="1600" dirty="0" smtClean="0"/>
+              <a:t>NHD HUC12 features: to identify project HUC8</a:t>
+            </a:r>
+          </a:p>
+          <a:p>
+            <a:pPr marL="285750" indent="-285750">
+              <a:buFont typeface="Arial" panose="020B0604020202020204" pitchFamily="34" charset="0"/>
+              <a:buChar char="•"/>
+            </a:pPr>
+            <a:endParaRPr lang="en-US" sz="1600" dirty="0"/>
+          </a:p>
+          <a:p>
+            <a:r>
+              <a:rPr lang="en-US" dirty="0" smtClean="0"/>
+              <a:t>Workflow</a:t>
+            </a:r>
+            <a:r>
+              <a:rPr lang="en-US" sz="1600" dirty="0" smtClean="0"/>
+              <a:t>:</a:t>
+            </a:r>
+          </a:p>
+          <a:p>
+            <a:pPr marL="285750" indent="-285750">
+              <a:buFont typeface="Arial" panose="020B0604020202020204" pitchFamily="34" charset="0"/>
+              <a:buChar char="•"/>
+            </a:pPr>
+            <a:r>
+              <a:rPr lang="en-US" sz="1600" dirty="0" smtClean="0"/>
+              <a:t>Compute the land cover changes from the project</a:t>
+            </a:r>
+          </a:p>
+          <a:p>
+            <a:pPr marL="742950" lvl="1" indent="-285750">
+              <a:buFont typeface="Arial" panose="020B0604020202020204" pitchFamily="34" charset="0"/>
+              <a:buChar char="•"/>
+            </a:pPr>
+            <a:r>
+              <a:rPr lang="en-US" sz="1600" dirty="0" smtClean="0"/>
+              <a:t>Net loss of NLCD cover types</a:t>
+            </a:r>
+          </a:p>
+          <a:p>
+            <a:pPr marL="742950" lvl="1" indent="-285750">
+              <a:buFont typeface="Arial" panose="020B0604020202020204" pitchFamily="34" charset="0"/>
+              <a:buChar char="•"/>
+            </a:pPr>
+            <a:r>
+              <a:rPr lang="en-US" sz="1600" dirty="0" smtClean="0"/>
+              <a:t>Net loss of NLCD cover types in riparian zone</a:t>
+            </a:r>
+          </a:p>
+          <a:p>
+            <a:pPr marL="742950" lvl="1" indent="-285750">
+              <a:buFont typeface="Arial" panose="020B0604020202020204" pitchFamily="34" charset="0"/>
+              <a:buChar char="•"/>
+            </a:pPr>
+            <a:r>
+              <a:rPr lang="en-US" sz="1600" dirty="0" smtClean="0"/>
+              <a:t>Net loss of NLCD cover types in mid-slope areas</a:t>
+            </a:r>
+          </a:p>
+          <a:p>
+            <a:pPr marL="742950" lvl="1" indent="-285750">
+              <a:buFont typeface="Arial" panose="020B0604020202020204" pitchFamily="34" charset="0"/>
+              <a:buChar char="•"/>
+            </a:pPr>
+            <a:r>
+              <a:rPr lang="en-US" sz="1600" dirty="0" smtClean="0"/>
+              <a:t>Net loss of NLCD cover types in high-slope areas</a:t>
+            </a:r>
+          </a:p>
+          <a:p>
+            <a:pPr marL="285750" indent="-285750">
+              <a:buFont typeface="Arial" panose="020B0604020202020204" pitchFamily="34" charset="0"/>
+              <a:buChar char="•"/>
+            </a:pPr>
+            <a:r>
+              <a:rPr lang="en-US" sz="1600" dirty="0" smtClean="0"/>
+              <a:t>Identify the NHD catchment and HUC8 in which the project occurs</a:t>
+            </a:r>
+          </a:p>
+          <a:p>
+            <a:pPr marL="742950" lvl="1" indent="-285750">
+              <a:buFont typeface="Arial" panose="020B0604020202020204" pitchFamily="34" charset="0"/>
+              <a:buChar char="•"/>
+            </a:pPr>
+            <a:r>
+              <a:rPr lang="en-US" sz="1600" dirty="0" smtClean="0"/>
+              <a:t>Extract the NHD Catchment raster by the project </a:t>
+            </a:r>
+            <a:r>
+              <a:rPr lang="en-US" sz="1600" dirty="0"/>
+              <a:t>polygon</a:t>
+            </a:r>
+            <a:endParaRPr lang="en-US" sz="1600" dirty="0" smtClean="0"/>
+          </a:p>
+          <a:p>
+            <a:pPr marL="742950" lvl="1" indent="-285750">
+              <a:buFont typeface="Arial" panose="020B0604020202020204" pitchFamily="34" charset="0"/>
+              <a:buChar char="•"/>
+            </a:pPr>
+            <a:r>
+              <a:rPr lang="en-US" sz="1600" dirty="0" smtClean="0"/>
+              <a:t>Clip the HUC12 feature with the project polygon</a:t>
+            </a:r>
+          </a:p>
+          <a:p>
+            <a:pPr marL="285750" indent="-285750">
+              <a:buFont typeface="Arial" panose="020B0604020202020204" pitchFamily="34" charset="0"/>
+              <a:buChar char="•"/>
+            </a:pPr>
+            <a:r>
+              <a:rPr lang="en-US" sz="1600" dirty="0" smtClean="0"/>
+              <a:t>Create a list of the StreamCat CSV files to add to the output SWD</a:t>
+            </a:r>
+          </a:p>
+          <a:p>
+            <a:pPr marL="742950" lvl="1" indent="-285750">
+              <a:buFont typeface="Arial" panose="020B0604020202020204" pitchFamily="34" charset="0"/>
+              <a:buChar char="•"/>
+            </a:pPr>
+            <a:r>
+              <a:rPr lang="en-US" sz="1600" dirty="0" smtClean="0"/>
+              <a:t>Use the </a:t>
+            </a:r>
+            <a:r>
+              <a:rPr lang="en-US" sz="1600" dirty="0" err="1" smtClean="0"/>
+              <a:t>FieldMappings</a:t>
+            </a:r>
+            <a:r>
+              <a:rPr lang="en-US" sz="1600" dirty="0" smtClean="0"/>
+              <a:t> table to identify those CSV files with attributes that will change with the project, i.e., those linked to land cover change. </a:t>
+            </a:r>
+          </a:p>
+          <a:p>
+            <a:pPr marL="285750" indent="-285750">
+              <a:buFont typeface="Arial" panose="020B0604020202020204" pitchFamily="34" charset="0"/>
+              <a:buChar char="•"/>
+            </a:pPr>
+            <a:r>
+              <a:rPr lang="en-US" sz="1600" dirty="0" smtClean="0"/>
+              <a:t>Loop through each StreamCat CSV file…</a:t>
+            </a:r>
+          </a:p>
+          <a:p>
+            <a:pPr lvl="1"/>
+            <a:endParaRPr lang="en-US" sz="1600" dirty="0" smtClean="0"/>
+          </a:p>
+        </p:txBody>
+      </p:sp>
+    </p:spTree>
+    <p:extLst>
+      <p:ext uri="{BB962C8B-B14F-4D97-AF65-F5344CB8AC3E}">
+        <p14:creationId xmlns:p14="http://schemas.microsoft.com/office/powerpoint/2010/main" val="2188111740"/>
+      </p:ext>
+    </p:extLst>
+  </p:cSld>
+  <p:clrMapOvr>
+    <a:masterClrMapping/>
+  </p:clrMapOvr>
+  <mc:AlternateContent xmlns:mc="http://schemas.openxmlformats.org/markup-compatibility/2006" xmlns:p14="http://schemas.microsoft.com/office/powerpoint/2010/main">
+    <mc:Choice Requires="p14">
+      <p:transition spd="slow" p14:dur="2000"/>
+    </mc:Choice>
+    <mc:Fallback xmlns="">
+      <p:transition spd="slow"/>
+    </mc:Fallback>
+  </mc:AlternateContent>
+  <p:timing>
+    <p:tnLst>
+      <p:par>
+        <p:cTn id="1" dur="indefinite" restart="never" nodeType="tmRoot"/>
+      </p:par>
+    </p:tnLst>
+  </p:timing>
+</p:sld>
+</file>
+
+<file path=ppt/slides/slide17.xml><?xml version="1.0" encoding="utf-8"?>
 <p:sld xmlns:a="http://schemas.openxmlformats.org/drawingml/2006/main" xmlns:r="http://schemas.openxmlformats.org/officeDocument/2006/relationships" xmlns:p="http://schemas.openxmlformats.org/presentationml/2006/main">
   <p:cSld>
     <p:spTree>
@@ -22020,7 +22451,7 @@
 </p:sld>
 </file>
 
-<file path=ppt/slides/slide17.xml><?xml version="1.0" encoding="utf-8"?>
+<file path=ppt/slides/slide18.xml><?xml version="1.0" encoding="utf-8"?>
 <p:sld xmlns:a="http://schemas.openxmlformats.org/drawingml/2006/main" xmlns:r="http://schemas.openxmlformats.org/officeDocument/2006/relationships" xmlns:p="http://schemas.openxmlformats.org/presentationml/2006/main">
   <p:cSld>
     <p:spTree>
@@ -23535,261 +23966,6 @@
           <a:chExt cx="0" cy="0"/>
         </a:xfrm>
       </p:grpSpPr>
-      <p:pic>
-        <p:nvPicPr>
-          <p:cNvPr id="4" name="Content Placeholder 3"/>
-          <p:cNvPicPr>
-            <a:picLocks noGrp="1" noChangeAspect="1"/>
-          </p:cNvPicPr>
-          <p:nvPr>
-            <p:ph idx="1"/>
-          </p:nvPr>
-        </p:nvPicPr>
-        <p:blipFill>
-          <a:blip r:embed="rId2"/>
-          <a:stretch>
-            <a:fillRect/>
-          </a:stretch>
-        </p:blipFill>
-        <p:spPr>
-          <a:xfrm>
-            <a:off x="1512277" y="1126292"/>
-            <a:ext cx="9179169" cy="5742670"/>
-          </a:xfrm>
-          <a:prstGeom prst="rect">
-            <a:avLst/>
-          </a:prstGeom>
-        </p:spPr>
-      </p:pic>
-      <p:sp>
-        <p:nvSpPr>
-          <p:cNvPr id="2" name="Title 1"/>
-          <p:cNvSpPr>
-            <a:spLocks noGrp="1"/>
-          </p:cNvSpPr>
-          <p:nvPr>
-            <p:ph type="title"/>
-          </p:nvPr>
-        </p:nvSpPr>
-        <p:spPr/>
-        <p:txBody>
-          <a:bodyPr/>
-          <a:lstStyle/>
-          <a:p>
-            <a:pPr algn="ctr"/>
-            <a:r>
-              <a:rPr lang="en-US" dirty="0" smtClean="0"/>
-              <a:t>Demo</a:t>
-            </a:r>
-            <a:endParaRPr lang="en-US" dirty="0"/>
-          </a:p>
-        </p:txBody>
-      </p:sp>
-    </p:spTree>
-    <p:extLst>
-      <p:ext uri="{BB962C8B-B14F-4D97-AF65-F5344CB8AC3E}">
-        <p14:creationId xmlns:p14="http://schemas.microsoft.com/office/powerpoint/2010/main" val="2898473396"/>
-      </p:ext>
-    </p:extLst>
-  </p:cSld>
-  <p:clrMapOvr>
-    <a:masterClrMapping/>
-  </p:clrMapOvr>
-  <p:timing>
-    <p:tnLst>
-      <p:par>
-        <p:cTn id="1" dur="indefinite" restart="never" nodeType="tmRoot"/>
-      </p:par>
-    </p:tnLst>
-  </p:timing>
-</p:sld>
-</file>
-
-<file path=ppt/slides/slide6.xml><?xml version="1.0" encoding="utf-8"?>
-<p:sld xmlns:a="http://schemas.openxmlformats.org/drawingml/2006/main" xmlns:r="http://schemas.openxmlformats.org/officeDocument/2006/relationships" xmlns:p="http://schemas.openxmlformats.org/presentationml/2006/main">
-  <p:cSld>
-    <p:spTree>
-      <p:nvGrpSpPr>
-        <p:cNvPr id="1" name=""/>
-        <p:cNvGrpSpPr/>
-        <p:nvPr/>
-      </p:nvGrpSpPr>
-      <p:grpSpPr>
-        <a:xfrm>
-          <a:off x="0" y="0"/>
-          <a:ext cx="0" cy="0"/>
-          <a:chOff x="0" y="0"/>
-          <a:chExt cx="0" cy="0"/>
-        </a:xfrm>
-      </p:grpSpPr>
-      <p:sp>
-        <p:nvSpPr>
-          <p:cNvPr id="2" name="Title 1"/>
-          <p:cNvSpPr>
-            <a:spLocks noGrp="1"/>
-          </p:cNvSpPr>
-          <p:nvPr>
-            <p:ph type="title"/>
-          </p:nvPr>
-        </p:nvSpPr>
-        <p:spPr/>
-        <p:txBody>
-          <a:bodyPr/>
-          <a:lstStyle/>
-          <a:p>
-            <a:r>
-              <a:rPr lang="en-US" dirty="0" smtClean="0"/>
-              <a:t>What’s next</a:t>
-            </a:r>
-            <a:endParaRPr lang="en-US" dirty="0"/>
-          </a:p>
-        </p:txBody>
-      </p:sp>
-      <p:sp>
-        <p:nvSpPr>
-          <p:cNvPr id="3" name="Content Placeholder 2"/>
-          <p:cNvSpPr>
-            <a:spLocks noGrp="1"/>
-          </p:cNvSpPr>
-          <p:nvPr>
-            <p:ph idx="1"/>
-          </p:nvPr>
-        </p:nvSpPr>
-        <p:spPr/>
-        <p:txBody>
-          <a:bodyPr/>
-          <a:lstStyle/>
-          <a:p>
-            <a:r>
-              <a:rPr lang="en-US" dirty="0" smtClean="0">
-                <a:solidFill>
-                  <a:srgbClr val="0070C0"/>
-                </a:solidFill>
-              </a:rPr>
-              <a:t>Incorporate changes to other </a:t>
-            </a:r>
-            <a:r>
-              <a:rPr lang="en-US" dirty="0" smtClean="0">
-                <a:solidFill>
-                  <a:srgbClr val="0070C0"/>
-                </a:solidFill>
-                <a:hlinkClick r:id="rId2"/>
-              </a:rPr>
-              <a:t>StreamCat attributes </a:t>
-            </a:r>
-            <a:r>
-              <a:rPr lang="en-US" dirty="0" smtClean="0">
-                <a:solidFill>
-                  <a:srgbClr val="0070C0"/>
-                </a:solidFill>
-              </a:rPr>
-              <a:t>into contingent with wetland area</a:t>
-            </a:r>
-          </a:p>
-          <a:p>
-            <a:pPr lvl="1"/>
-            <a:r>
-              <a:rPr lang="en-US" dirty="0" smtClean="0"/>
-              <a:t>e.g., Use water models to estimate change in mean runoff, base flow, nutrients…</a:t>
-            </a:r>
-          </a:p>
-          <a:p>
-            <a:pPr lvl="1"/>
-            <a:r>
-              <a:rPr lang="en-US" dirty="0" smtClean="0"/>
-              <a:t>These revised conditions will go into Maxent projection models</a:t>
-            </a:r>
-          </a:p>
-          <a:p>
-            <a:pPr lvl="1"/>
-            <a:endParaRPr lang="en-US" dirty="0" smtClean="0"/>
-          </a:p>
-          <a:p>
-            <a:r>
-              <a:rPr lang="en-US" dirty="0" smtClean="0">
-                <a:solidFill>
-                  <a:srgbClr val="0070C0"/>
-                </a:solidFill>
-              </a:rPr>
-              <a:t>Compare uplift with future uplift using FUTURES model outputs</a:t>
-            </a:r>
-          </a:p>
-          <a:p>
-            <a:pPr lvl="1"/>
-            <a:r>
-              <a:rPr lang="en-US" dirty="0" smtClean="0"/>
-              <a:t>Compute current and modified habitat likelihoods using 2030 NLCD</a:t>
-            </a:r>
-          </a:p>
-          <a:p>
-            <a:pPr lvl="1"/>
-            <a:endParaRPr lang="en-US" dirty="0"/>
-          </a:p>
-          <a:p>
-            <a:r>
-              <a:rPr lang="en-US" dirty="0" smtClean="0">
-                <a:solidFill>
-                  <a:srgbClr val="0070C0"/>
-                </a:solidFill>
-              </a:rPr>
-              <a:t>Link with terrestrial habitat uplift models/</a:t>
-            </a:r>
-            <a:r>
-              <a:rPr lang="en-US" dirty="0" err="1" smtClean="0">
-                <a:solidFill>
-                  <a:srgbClr val="0070C0"/>
-                </a:solidFill>
-              </a:rPr>
-              <a:t>GeoHAT</a:t>
-            </a:r>
-            <a:r>
-              <a:rPr lang="en-US" dirty="0" smtClean="0">
-                <a:solidFill>
-                  <a:srgbClr val="0070C0"/>
-                </a:solidFill>
-              </a:rPr>
-              <a:t>…</a:t>
-            </a:r>
-          </a:p>
-        </p:txBody>
-      </p:sp>
-    </p:spTree>
-    <p:extLst>
-      <p:ext uri="{BB962C8B-B14F-4D97-AF65-F5344CB8AC3E}">
-        <p14:creationId xmlns:p14="http://schemas.microsoft.com/office/powerpoint/2010/main" val="4113823692"/>
-      </p:ext>
-    </p:extLst>
-  </p:cSld>
-  <p:clrMapOvr>
-    <a:masterClrMapping/>
-  </p:clrMapOvr>
-  <p:timing>
-    <p:tnLst>
-      <p:par>
-        <p:cTn id="1" dur="indefinite" restart="never" nodeType="tmRoot"/>
-      </p:par>
-    </p:tnLst>
-  </p:timing>
-</p:sld>
-</file>
-
-<file path=ppt/slides/slide7.xml><?xml version="1.0" encoding="utf-8"?>
-<p:sld xmlns:a="http://schemas.openxmlformats.org/drawingml/2006/main" xmlns:r="http://schemas.openxmlformats.org/officeDocument/2006/relationships" xmlns:p="http://schemas.openxmlformats.org/presentationml/2006/main">
-  <p:cSld>
-    <p:spTree>
-      <p:nvGrpSpPr>
-        <p:cNvPr id="1" name=""/>
-        <p:cNvGrpSpPr/>
-        <p:nvPr/>
-      </p:nvGrpSpPr>
-      <p:grpSpPr>
-        <a:xfrm>
-          <a:off x="0" y="0"/>
-          <a:ext cx="0" cy="0"/>
-          <a:chOff x="0" y="0"/>
-          <a:chExt cx="0" cy="0"/>
-        </a:xfrm>
-      </p:grpSpPr>
       <p:sp>
         <p:nvSpPr>
           <p:cNvPr id="2" name="Title 1"/>
@@ -23860,7 +24036,330 @@
 </p:sld>
 </file>
 
+<file path=ppt/slides/slide6.xml><?xml version="1.0" encoding="utf-8"?>
+<p:sld xmlns:a="http://schemas.openxmlformats.org/drawingml/2006/main" xmlns:r="http://schemas.openxmlformats.org/officeDocument/2006/relationships" xmlns:p="http://schemas.openxmlformats.org/presentationml/2006/main">
+  <p:cSld>
+    <p:spTree>
+      <p:nvGrpSpPr>
+        <p:cNvPr id="1" name=""/>
+        <p:cNvGrpSpPr/>
+        <p:nvPr/>
+      </p:nvGrpSpPr>
+      <p:grpSpPr>
+        <a:xfrm>
+          <a:off x="0" y="0"/>
+          <a:ext cx="0" cy="0"/>
+          <a:chOff x="0" y="0"/>
+          <a:chExt cx="0" cy="0"/>
+        </a:xfrm>
+      </p:grpSpPr>
+      <p:pic>
+        <p:nvPicPr>
+          <p:cNvPr id="4" name="Content Placeholder 3"/>
+          <p:cNvPicPr>
+            <a:picLocks noGrp="1" noChangeAspect="1"/>
+          </p:cNvPicPr>
+          <p:nvPr>
+            <p:ph idx="1"/>
+          </p:nvPr>
+        </p:nvPicPr>
+        <p:blipFill>
+          <a:blip r:embed="rId2"/>
+          <a:stretch>
+            <a:fillRect/>
+          </a:stretch>
+        </p:blipFill>
+        <p:spPr>
+          <a:xfrm>
+            <a:off x="1512277" y="1126292"/>
+            <a:ext cx="9179169" cy="5742670"/>
+          </a:xfrm>
+          <a:prstGeom prst="rect">
+            <a:avLst/>
+          </a:prstGeom>
+        </p:spPr>
+      </p:pic>
+      <p:sp>
+        <p:nvSpPr>
+          <p:cNvPr id="2" name="Title 1"/>
+          <p:cNvSpPr>
+            <a:spLocks noGrp="1"/>
+          </p:cNvSpPr>
+          <p:nvPr>
+            <p:ph type="title"/>
+          </p:nvPr>
+        </p:nvSpPr>
+        <p:spPr/>
+        <p:txBody>
+          <a:bodyPr/>
+          <a:lstStyle/>
+          <a:p>
+            <a:pPr algn="ctr"/>
+            <a:r>
+              <a:rPr lang="en-US" dirty="0" smtClean="0"/>
+              <a:t>Demo</a:t>
+            </a:r>
+            <a:endParaRPr lang="en-US" dirty="0"/>
+          </a:p>
+        </p:txBody>
+      </p:sp>
+    </p:spTree>
+    <p:extLst>
+      <p:ext uri="{BB962C8B-B14F-4D97-AF65-F5344CB8AC3E}">
+        <p14:creationId xmlns:p14="http://schemas.microsoft.com/office/powerpoint/2010/main" val="2898473396"/>
+      </p:ext>
+    </p:extLst>
+  </p:cSld>
+  <p:clrMapOvr>
+    <a:masterClrMapping/>
+  </p:clrMapOvr>
+  <p:timing>
+    <p:tnLst>
+      <p:par>
+        <p:cTn id="1" dur="indefinite" restart="never" nodeType="tmRoot"/>
+      </p:par>
+    </p:tnLst>
+  </p:timing>
+</p:sld>
+</file>
+
+<file path=ppt/slides/slide7.xml><?xml version="1.0" encoding="utf-8"?>
+<p:sld xmlns:a="http://schemas.openxmlformats.org/drawingml/2006/main" xmlns:r="http://schemas.openxmlformats.org/officeDocument/2006/relationships" xmlns:p="http://schemas.openxmlformats.org/presentationml/2006/main">
+  <p:cSld>
+    <p:spTree>
+      <p:nvGrpSpPr>
+        <p:cNvPr id="1" name=""/>
+        <p:cNvGrpSpPr/>
+        <p:nvPr/>
+      </p:nvGrpSpPr>
+      <p:grpSpPr>
+        <a:xfrm>
+          <a:off x="0" y="0"/>
+          <a:ext cx="0" cy="0"/>
+          <a:chOff x="0" y="0"/>
+          <a:chExt cx="0" cy="0"/>
+        </a:xfrm>
+      </p:grpSpPr>
+      <p:sp>
+        <p:nvSpPr>
+          <p:cNvPr id="2" name="Title 1"/>
+          <p:cNvSpPr>
+            <a:spLocks noGrp="1"/>
+          </p:cNvSpPr>
+          <p:nvPr>
+            <p:ph type="title"/>
+          </p:nvPr>
+        </p:nvSpPr>
+        <p:spPr/>
+        <p:txBody>
+          <a:bodyPr/>
+          <a:lstStyle/>
+          <a:p>
+            <a:r>
+              <a:rPr lang="en-US" dirty="0" smtClean="0"/>
+              <a:t>What’s next</a:t>
+            </a:r>
+            <a:endParaRPr lang="en-US" dirty="0"/>
+          </a:p>
+        </p:txBody>
+      </p:sp>
+      <p:sp>
+        <p:nvSpPr>
+          <p:cNvPr id="3" name="Content Placeholder 2"/>
+          <p:cNvSpPr>
+            <a:spLocks noGrp="1"/>
+          </p:cNvSpPr>
+          <p:nvPr>
+            <p:ph idx="1"/>
+          </p:nvPr>
+        </p:nvSpPr>
+        <p:spPr/>
+        <p:txBody>
+          <a:bodyPr/>
+          <a:lstStyle/>
+          <a:p>
+            <a:r>
+              <a:rPr lang="en-US" dirty="0" smtClean="0">
+                <a:solidFill>
+                  <a:srgbClr val="0070C0"/>
+                </a:solidFill>
+              </a:rPr>
+              <a:t>Incorporate changes to other </a:t>
+            </a:r>
+            <a:r>
+              <a:rPr lang="en-US" dirty="0" smtClean="0">
+                <a:solidFill>
+                  <a:srgbClr val="0070C0"/>
+                </a:solidFill>
+                <a:hlinkClick r:id="rId2"/>
+              </a:rPr>
+              <a:t>StreamCat attributes </a:t>
+            </a:r>
+            <a:r>
+              <a:rPr lang="en-US" dirty="0" smtClean="0">
+                <a:solidFill>
+                  <a:srgbClr val="0070C0"/>
+                </a:solidFill>
+              </a:rPr>
+              <a:t>into contingent with wetland area</a:t>
+            </a:r>
+          </a:p>
+          <a:p>
+            <a:pPr lvl="1"/>
+            <a:r>
+              <a:rPr lang="en-US" dirty="0" smtClean="0"/>
+              <a:t>e.g., Use water models to estimate change in mean runoff, base flow, nutrients…</a:t>
+            </a:r>
+          </a:p>
+          <a:p>
+            <a:pPr lvl="1"/>
+            <a:r>
+              <a:rPr lang="en-US" dirty="0" smtClean="0"/>
+              <a:t>These revised conditions will go into Maxent projection models</a:t>
+            </a:r>
+          </a:p>
+          <a:p>
+            <a:pPr lvl="1"/>
+            <a:endParaRPr lang="en-US" dirty="0" smtClean="0"/>
+          </a:p>
+          <a:p>
+            <a:r>
+              <a:rPr lang="en-US" dirty="0" smtClean="0">
+                <a:solidFill>
+                  <a:srgbClr val="0070C0"/>
+                </a:solidFill>
+              </a:rPr>
+              <a:t>Compare uplift with future uplift using FUTURES model outputs</a:t>
+            </a:r>
+          </a:p>
+          <a:p>
+            <a:pPr lvl="1"/>
+            <a:r>
+              <a:rPr lang="en-US" dirty="0" smtClean="0"/>
+              <a:t>Compute current and modified habitat likelihoods using 2030 NLCD</a:t>
+            </a:r>
+          </a:p>
+          <a:p>
+            <a:pPr lvl="1"/>
+            <a:endParaRPr lang="en-US" dirty="0"/>
+          </a:p>
+          <a:p>
+            <a:r>
+              <a:rPr lang="en-US" dirty="0" smtClean="0">
+                <a:solidFill>
+                  <a:srgbClr val="0070C0"/>
+                </a:solidFill>
+              </a:rPr>
+              <a:t>Link with terrestrial habitat uplift models/</a:t>
+            </a:r>
+            <a:r>
+              <a:rPr lang="en-US" dirty="0" err="1" smtClean="0">
+                <a:solidFill>
+                  <a:srgbClr val="0070C0"/>
+                </a:solidFill>
+              </a:rPr>
+              <a:t>GeoHAT</a:t>
+            </a:r>
+            <a:r>
+              <a:rPr lang="en-US" dirty="0" smtClean="0">
+                <a:solidFill>
+                  <a:srgbClr val="0070C0"/>
+                </a:solidFill>
+              </a:rPr>
+              <a:t>…</a:t>
+            </a:r>
+          </a:p>
+        </p:txBody>
+      </p:sp>
+    </p:spTree>
+    <p:extLst>
+      <p:ext uri="{BB962C8B-B14F-4D97-AF65-F5344CB8AC3E}">
+        <p14:creationId xmlns:p14="http://schemas.microsoft.com/office/powerpoint/2010/main" val="4113823692"/>
+      </p:ext>
+    </p:extLst>
+  </p:cSld>
+  <p:clrMapOvr>
+    <a:masterClrMapping/>
+  </p:clrMapOvr>
+  <p:timing>
+    <p:tnLst>
+      <p:par>
+        <p:cTn id="1" dur="indefinite" restart="never" nodeType="tmRoot"/>
+      </p:par>
+    </p:tnLst>
+  </p:timing>
+</p:sld>
+</file>
+
 <file path=ppt/slides/slide8.xml><?xml version="1.0" encoding="utf-8"?>
+<p:sld xmlns:a="http://schemas.openxmlformats.org/drawingml/2006/main" xmlns:r="http://schemas.openxmlformats.org/officeDocument/2006/relationships" xmlns:p="http://schemas.openxmlformats.org/presentationml/2006/main">
+  <p:cSld>
+    <p:spTree>
+      <p:nvGrpSpPr>
+        <p:cNvPr id="1" name=""/>
+        <p:cNvGrpSpPr/>
+        <p:nvPr/>
+      </p:nvGrpSpPr>
+      <p:grpSpPr>
+        <a:xfrm>
+          <a:off x="0" y="0"/>
+          <a:ext cx="0" cy="0"/>
+          <a:chOff x="0" y="0"/>
+          <a:chExt cx="0" cy="0"/>
+        </a:xfrm>
+      </p:grpSpPr>
+      <p:sp>
+        <p:nvSpPr>
+          <p:cNvPr id="2" name="Title 1"/>
+          <p:cNvSpPr>
+            <a:spLocks noGrp="1"/>
+          </p:cNvSpPr>
+          <p:nvPr>
+            <p:ph type="title"/>
+          </p:nvPr>
+        </p:nvSpPr>
+        <p:spPr/>
+        <p:txBody>
+          <a:bodyPr/>
+          <a:lstStyle/>
+          <a:p>
+            <a:endParaRPr lang="en-US"/>
+          </a:p>
+        </p:txBody>
+      </p:sp>
+      <p:sp>
+        <p:nvSpPr>
+          <p:cNvPr id="3" name="Content Placeholder 2"/>
+          <p:cNvSpPr>
+            <a:spLocks noGrp="1"/>
+          </p:cNvSpPr>
+          <p:nvPr>
+            <p:ph idx="1"/>
+          </p:nvPr>
+        </p:nvSpPr>
+        <p:spPr/>
+        <p:txBody>
+          <a:bodyPr/>
+          <a:lstStyle/>
+          <a:p>
+            <a:endParaRPr lang="en-US"/>
+          </a:p>
+        </p:txBody>
+      </p:sp>
+    </p:spTree>
+    <p:extLst>
+      <p:ext uri="{BB962C8B-B14F-4D97-AF65-F5344CB8AC3E}">
+        <p14:creationId xmlns:p14="http://schemas.microsoft.com/office/powerpoint/2010/main" val="4234603874"/>
+      </p:ext>
+    </p:extLst>
+  </p:cSld>
+  <p:clrMapOvr>
+    <a:masterClrMapping/>
+  </p:clrMapOvr>
+</p:sld>
+</file>
+
+<file path=ppt/slides/slide9.xml><?xml version="1.0" encoding="utf-8"?>
 <p:sld xmlns:a="http://schemas.openxmlformats.org/drawingml/2006/main" xmlns:r="http://schemas.openxmlformats.org/officeDocument/2006/relationships" xmlns:p="http://schemas.openxmlformats.org/presentationml/2006/main" show="0">
   <p:cSld>
     <p:spTree>
@@ -25055,458 +25554,11 @@
   <p:clrMapOvr>
     <a:masterClrMapping/>
   </p:clrMapOvr>
-  <mc:AlternateContent xmlns:mc="http://schemas.openxmlformats.org/markup-compatibility/2006">
-    <mc:Choice xmlns:p14="http://schemas.microsoft.com/office/powerpoint/2010/main" Requires="p14">
+  <mc:AlternateContent xmlns:mc="http://schemas.openxmlformats.org/markup-compatibility/2006" xmlns:p14="http://schemas.microsoft.com/office/powerpoint/2010/main">
+    <mc:Choice Requires="p14">
       <p:transition spd="slow" p14:dur="2000"/>
     </mc:Choice>
-    <mc:Fallback>
-      <p:transition spd="slow"/>
-    </mc:Fallback>
-  </mc:AlternateContent>
-  <p:timing>
-    <p:tnLst>
-      <p:par>
-        <p:cTn id="1" dur="indefinite" restart="never" nodeType="tmRoot"/>
-      </p:par>
-    </p:tnLst>
-  </p:timing>
-</p:sld>
-</file>
-
-<file path=ppt/slides/slide9.xml><?xml version="1.0" encoding="utf-8"?>
-<p:sld xmlns:a="http://schemas.openxmlformats.org/drawingml/2006/main" xmlns:r="http://schemas.openxmlformats.org/officeDocument/2006/relationships" xmlns:p="http://schemas.openxmlformats.org/presentationml/2006/main" show="0">
-  <p:cSld>
-    <p:spTree>
-      <p:nvGrpSpPr>
-        <p:cNvPr id="1" name=""/>
-        <p:cNvGrpSpPr/>
-        <p:nvPr/>
-      </p:nvGrpSpPr>
-      <p:grpSpPr>
-        <a:xfrm>
-          <a:off x="0" y="0"/>
-          <a:ext cx="0" cy="0"/>
-          <a:chOff x="0" y="0"/>
-          <a:chExt cx="0" cy="0"/>
-        </a:xfrm>
-      </p:grpSpPr>
-      <p:sp>
-        <p:nvSpPr>
-          <p:cNvPr id="2" name="TextBox 1"/>
-          <p:cNvSpPr txBox="1"/>
-          <p:nvPr/>
-        </p:nvSpPr>
-        <p:spPr>
-          <a:xfrm>
-            <a:off x="264404" y="341523"/>
-            <a:ext cx="3002425" cy="769441"/>
-          </a:xfrm>
-          <a:prstGeom prst="rect">
-            <a:avLst/>
-          </a:prstGeom>
-          <a:noFill/>
-        </p:spPr>
-        <p:txBody>
-          <a:bodyPr wrap="none" rtlCol="0">
-            <a:spAutoFit/>
-          </a:bodyPr>
-          <a:lstStyle/>
-          <a:p>
-            <a:r>
-              <a:rPr lang="en-US" sz="4400" dirty="0" smtClean="0"/>
-              <a:t>Data Prep: 2</a:t>
-            </a:r>
-            <a:endParaRPr lang="en-US" sz="4400" dirty="0"/>
-          </a:p>
-        </p:txBody>
-      </p:sp>
-      <p:sp>
-        <p:nvSpPr>
-          <p:cNvPr id="3" name="TextBox 2"/>
-          <p:cNvSpPr txBox="1"/>
-          <p:nvPr/>
-        </p:nvSpPr>
-        <p:spPr>
-          <a:xfrm>
-            <a:off x="386359" y="1110964"/>
-            <a:ext cx="7683753" cy="3447098"/>
-          </a:xfrm>
-          <a:prstGeom prst="rect">
-            <a:avLst/>
-          </a:prstGeom>
-          <a:noFill/>
-        </p:spPr>
-        <p:txBody>
-          <a:bodyPr wrap="square" rtlCol="0">
-            <a:spAutoFit/>
-          </a:bodyPr>
-          <a:lstStyle/>
-          <a:p>
-            <a:pPr marL="342900" indent="-342900">
-              <a:buFont typeface="+mj-lt"/>
-              <a:buAutoNum type="arabicPeriod"/>
-            </a:pPr>
-            <a:r>
-              <a:rPr lang="en-US" b="1" dirty="0" smtClean="0"/>
-              <a:t>Generate StreamCat</a:t>
-            </a:r>
-            <a:r>
-              <a:rPr lang="en-US" b="1" dirty="0"/>
-              <a:t> attribute list: </a:t>
-            </a:r>
-            <a:r>
-              <a:rPr lang="en-US" sz="1400" dirty="0" smtClean="0"/>
-              <a:t>Create </a:t>
-            </a:r>
-            <a:r>
-              <a:rPr lang="en-US" sz="1400" dirty="0"/>
-              <a:t>a CSV file listing all the attributes included in the Stream Cat data alongside the file in which they occur. This is used in later scripts to extract specific attributes from the proper file</a:t>
-            </a:r>
-            <a:r>
-              <a:rPr lang="en-US" sz="1400" dirty="0" smtClean="0"/>
-              <a:t>.</a:t>
-            </a:r>
-          </a:p>
-          <a:p>
-            <a:pPr marL="342900" indent="-342900">
-              <a:buFont typeface="+mj-lt"/>
-              <a:buAutoNum type="arabicPeriod"/>
-            </a:pPr>
-            <a:endParaRPr lang="en-US" sz="1400" dirty="0"/>
-          </a:p>
-          <a:p>
-            <a:pPr marL="342900" indent="-342900">
-              <a:buFont typeface="+mj-lt"/>
-              <a:buAutoNum type="arabicPeriod"/>
-            </a:pPr>
-            <a:endParaRPr lang="en-US" sz="1400" dirty="0" smtClean="0"/>
-          </a:p>
-          <a:p>
-            <a:pPr marL="342900" indent="-342900">
-              <a:buFont typeface="+mj-lt"/>
-              <a:buAutoNum type="arabicPeriod"/>
-            </a:pPr>
-            <a:endParaRPr lang="en-US" sz="1400" dirty="0"/>
-          </a:p>
-          <a:p>
-            <a:pPr marL="342900" indent="-342900">
-              <a:buFont typeface="+mj-lt"/>
-              <a:buAutoNum type="arabicPeriod"/>
-            </a:pPr>
-            <a:endParaRPr lang="en-US" sz="1400" dirty="0" smtClean="0"/>
-          </a:p>
-          <a:p>
-            <a:pPr marL="342900" indent="-342900">
-              <a:buFont typeface="+mj-lt"/>
-              <a:buAutoNum type="arabicPeriod"/>
-            </a:pPr>
-            <a:endParaRPr lang="en-US" sz="1400" dirty="0"/>
-          </a:p>
-          <a:p>
-            <a:pPr marL="342900" indent="-342900">
-              <a:buFont typeface="+mj-lt"/>
-              <a:buAutoNum type="arabicPeriod"/>
-            </a:pPr>
-            <a:endParaRPr lang="en-US" sz="1400" dirty="0" smtClean="0"/>
-          </a:p>
-          <a:p>
-            <a:pPr marL="342900" indent="-342900">
-              <a:buFont typeface="+mj-lt"/>
-              <a:buAutoNum type="arabicPeriod"/>
-            </a:pPr>
-            <a:endParaRPr lang="en-US" sz="1400" dirty="0" smtClean="0"/>
-          </a:p>
-          <a:p>
-            <a:pPr marL="342900" indent="-342900">
-              <a:buFont typeface="+mj-lt"/>
-              <a:buAutoNum type="arabicPeriod"/>
-            </a:pPr>
-            <a:endParaRPr lang="en-US" sz="1400" dirty="0"/>
-          </a:p>
-          <a:p>
-            <a:pPr marL="342900" indent="-342900">
-              <a:buFont typeface="+mj-lt"/>
-              <a:buAutoNum type="arabicPeriod"/>
-            </a:pPr>
-            <a:endParaRPr lang="en-US" sz="1400" dirty="0" smtClean="0"/>
-          </a:p>
-          <a:p>
-            <a:pPr marL="342900" indent="-342900">
-              <a:buFont typeface="+mj-lt"/>
-              <a:buAutoNum type="arabicPeriod"/>
-            </a:pPr>
-            <a:r>
-              <a:rPr lang="en-US" b="1" dirty="0" smtClean="0"/>
-              <a:t>Set additional attribute filters</a:t>
-            </a:r>
-            <a:r>
-              <a:rPr lang="en-US" dirty="0" smtClean="0"/>
-              <a:t>: </a:t>
-            </a:r>
-            <a:r>
-              <a:rPr lang="en-US" sz="1400" dirty="0" smtClean="0"/>
-              <a:t>Manually pivot the list and add columns indicating whether the attribute is for the catchment (CAT) or entire watershed area (WS). Also indicate the NLCD class aligned with the attribute (or -9999 if none). </a:t>
-            </a:r>
-            <a:endParaRPr lang="en-US" sz="1600" dirty="0"/>
-          </a:p>
-        </p:txBody>
-      </p:sp>
-      <p:pic>
-        <p:nvPicPr>
-          <p:cNvPr id="21" name="Picture 20"/>
-          <p:cNvPicPr>
-            <a:picLocks noChangeAspect="1"/>
-          </p:cNvPicPr>
-          <p:nvPr/>
-        </p:nvPicPr>
-        <p:blipFill>
-          <a:blip r:embed="rId3"/>
-          <a:stretch>
-            <a:fillRect/>
-          </a:stretch>
-        </p:blipFill>
-        <p:spPr>
-          <a:xfrm>
-            <a:off x="3379265" y="4591618"/>
-            <a:ext cx="6196571" cy="1909763"/>
-          </a:xfrm>
-          <a:prstGeom prst="rect">
-            <a:avLst/>
-          </a:prstGeom>
-          <a:ln>
-            <a:noFill/>
-          </a:ln>
-          <a:effectLst>
-            <a:outerShdw blurRad="292100" dist="139700" dir="2700000" algn="tl" rotWithShape="0">
-              <a:srgbClr val="333333">
-                <a:alpha val="65000"/>
-              </a:srgbClr>
-            </a:outerShdw>
-          </a:effectLst>
-        </p:spPr>
-      </p:pic>
-      <p:pic>
-        <p:nvPicPr>
-          <p:cNvPr id="23" name="Picture 22"/>
-          <p:cNvPicPr>
-            <a:picLocks noChangeAspect="1"/>
-          </p:cNvPicPr>
-          <p:nvPr/>
-        </p:nvPicPr>
-        <p:blipFill>
-          <a:blip r:embed="rId4"/>
-          <a:stretch>
-            <a:fillRect/>
-          </a:stretch>
-        </p:blipFill>
-        <p:spPr>
-          <a:xfrm>
-            <a:off x="8240231" y="1683309"/>
-            <a:ext cx="3652944" cy="2431491"/>
-          </a:xfrm>
-          <a:prstGeom prst="rect">
-            <a:avLst/>
-          </a:prstGeom>
-          <a:ln>
-            <a:noFill/>
-          </a:ln>
-          <a:effectLst>
-            <a:outerShdw blurRad="292100" dist="139700" dir="2700000" algn="tl" rotWithShape="0">
-              <a:srgbClr val="333333">
-                <a:alpha val="65000"/>
-              </a:srgbClr>
-            </a:outerShdw>
-          </a:effectLst>
-        </p:spPr>
-      </p:pic>
-      <p:pic>
-        <p:nvPicPr>
-          <p:cNvPr id="25" name="Picture 24"/>
-          <p:cNvPicPr>
-            <a:picLocks noChangeAspect="1"/>
-          </p:cNvPicPr>
-          <p:nvPr/>
-        </p:nvPicPr>
-        <p:blipFill rotWithShape="1">
-          <a:blip r:embed="rId5"/>
-          <a:srcRect r="4729" b="8114"/>
-          <a:stretch/>
-        </p:blipFill>
-        <p:spPr>
-          <a:xfrm>
-            <a:off x="1786301" y="2027085"/>
-            <a:ext cx="4883868" cy="509777"/>
-          </a:xfrm>
-          <a:prstGeom prst="rect">
-            <a:avLst/>
-          </a:prstGeom>
-        </p:spPr>
-      </p:pic>
-      <p:cxnSp>
-        <p:nvCxnSpPr>
-          <p:cNvPr id="28" name="Straight Arrow Connector 27"/>
-          <p:cNvCxnSpPr>
-            <a:stCxn id="25" idx="3"/>
-            <a:endCxn id="23" idx="1"/>
-          </p:cNvCxnSpPr>
-          <p:nvPr/>
-        </p:nvCxnSpPr>
-        <p:spPr>
-          <a:xfrm>
-            <a:off x="6670169" y="2281974"/>
-            <a:ext cx="1570062" cy="617081"/>
-          </a:xfrm>
-          <a:prstGeom prst="straightConnector1">
-            <a:avLst/>
-          </a:prstGeom>
-          <a:ln>
-            <a:tailEnd type="triangle"/>
-          </a:ln>
-        </p:spPr>
-        <p:style>
-          <a:lnRef idx="1">
-            <a:schemeClr val="accent1"/>
-          </a:lnRef>
-          <a:fillRef idx="0">
-            <a:schemeClr val="accent1"/>
-          </a:fillRef>
-          <a:effectRef idx="0">
-            <a:schemeClr val="accent1"/>
-          </a:effectRef>
-          <a:fontRef idx="minor">
-            <a:schemeClr val="tx1"/>
-          </a:fontRef>
-        </p:style>
-      </p:cxnSp>
-      <p:sp>
-        <p:nvSpPr>
-          <p:cNvPr id="40" name="Rectangle 39"/>
-          <p:cNvSpPr/>
-          <p:nvPr/>
-        </p:nvSpPr>
-        <p:spPr>
-          <a:xfrm>
-            <a:off x="8560072" y="1003422"/>
-            <a:ext cx="3013261" cy="646331"/>
-          </a:xfrm>
-          <a:prstGeom prst="rect">
-            <a:avLst/>
-          </a:prstGeom>
-        </p:spPr>
-        <p:style>
-          <a:lnRef idx="2">
-            <a:schemeClr val="accent6"/>
-          </a:lnRef>
-          <a:fillRef idx="1">
-            <a:schemeClr val="lt1"/>
-          </a:fillRef>
-          <a:effectRef idx="0">
-            <a:schemeClr val="accent6"/>
-          </a:effectRef>
-          <a:fontRef idx="minor">
-            <a:schemeClr val="dk1"/>
-          </a:fontRef>
-        </p:style>
-        <p:txBody>
-          <a:bodyPr wrap="none">
-            <a:spAutoFit/>
-          </a:bodyPr>
-          <a:lstStyle/>
-          <a:p>
-            <a:r>
-              <a:rPr lang="en-US" i="1" dirty="0"/>
-              <a:t>C:\</a:t>
-            </a:r>
-            <a:r>
-              <a:rPr lang="en-US" i="1" dirty="0" smtClean="0"/>
-              <a:t>Workspace\GeoWET\Data\</a:t>
-            </a:r>
-          </a:p>
-          <a:p>
-            <a:r>
-              <a:rPr lang="en-US" i="1" dirty="0" err="1" smtClean="0"/>
-              <a:t>StreamCat</a:t>
-            </a:r>
-            <a:r>
-              <a:rPr lang="en-US" i="1" dirty="0" smtClean="0"/>
-              <a:t>\StreamCatInfo.csv</a:t>
-            </a:r>
-            <a:endParaRPr lang="en-US" i="1" dirty="0"/>
-          </a:p>
-        </p:txBody>
-      </p:sp>
-      <p:sp>
-        <p:nvSpPr>
-          <p:cNvPr id="41" name="Rectangle 40"/>
-          <p:cNvSpPr/>
-          <p:nvPr/>
-        </p:nvSpPr>
-        <p:spPr>
-          <a:xfrm>
-            <a:off x="264404" y="5256889"/>
-            <a:ext cx="3013261" cy="646331"/>
-          </a:xfrm>
-          <a:prstGeom prst="rect">
-            <a:avLst/>
-          </a:prstGeom>
-        </p:spPr>
-        <p:style>
-          <a:lnRef idx="2">
-            <a:schemeClr val="accent6"/>
-          </a:lnRef>
-          <a:fillRef idx="1">
-            <a:schemeClr val="lt1"/>
-          </a:fillRef>
-          <a:effectRef idx="0">
-            <a:schemeClr val="accent6"/>
-          </a:effectRef>
-          <a:fontRef idx="minor">
-            <a:schemeClr val="dk1"/>
-          </a:fontRef>
-        </p:style>
-        <p:txBody>
-          <a:bodyPr wrap="none">
-            <a:spAutoFit/>
-          </a:bodyPr>
-          <a:lstStyle/>
-          <a:p>
-            <a:r>
-              <a:rPr lang="en-US" i="1" dirty="0"/>
-              <a:t>C:\</a:t>
-            </a:r>
-            <a:r>
-              <a:rPr lang="en-US" i="1" dirty="0" smtClean="0"/>
-              <a:t>Workspace\GeoWET\Data\</a:t>
-            </a:r>
-          </a:p>
-          <a:p>
-            <a:r>
-              <a:rPr lang="en-US" i="1" dirty="0" err="1" smtClean="0"/>
-              <a:t>StreamCat</a:t>
-            </a:r>
-            <a:r>
-              <a:rPr lang="en-US" i="1" dirty="0" smtClean="0"/>
-              <a:t>\StreamCatInfo.xlsx</a:t>
-            </a:r>
-            <a:endParaRPr lang="en-US" i="1" dirty="0"/>
-          </a:p>
-        </p:txBody>
-      </p:sp>
-    </p:spTree>
-    <p:extLst>
-      <p:ext uri="{BB962C8B-B14F-4D97-AF65-F5344CB8AC3E}">
-        <p14:creationId xmlns:p14="http://schemas.microsoft.com/office/powerpoint/2010/main" val="1063045129"/>
-      </p:ext>
-    </p:extLst>
-  </p:cSld>
-  <p:clrMapOvr>
-    <a:masterClrMapping/>
-  </p:clrMapOvr>
-  <mc:AlternateContent xmlns:mc="http://schemas.openxmlformats.org/markup-compatibility/2006">
-    <mc:Choice xmlns:p14="http://schemas.microsoft.com/office/powerpoint/2010/main" Requires="p14">
-      <p:transition spd="slow" p14:dur="2000"/>
-    </mc:Choice>
-    <mc:Fallback>
+    <mc:Fallback xmlns="">
       <p:transition spd="slow"/>
     </mc:Fallback>
   </mc:AlternateContent>

</xml_diff>